<commit_message>
update powerpoint for week 6
</commit_message>
<xml_diff>
--- a/week-6/Hypermedia-design.pptx
+++ b/week-6/Hypermedia-design.pptx
@@ -8,13 +8,14 @@
     <p:sldId id="256" r:id="rId2"/>
     <p:sldId id="257" r:id="rId3"/>
     <p:sldId id="258" r:id="rId4"/>
-    <p:sldId id="265" r:id="rId5"/>
-    <p:sldId id="259" r:id="rId6"/>
-    <p:sldId id="260" r:id="rId7"/>
-    <p:sldId id="261" r:id="rId8"/>
-    <p:sldId id="262" r:id="rId9"/>
-    <p:sldId id="263" r:id="rId10"/>
-    <p:sldId id="264" r:id="rId11"/>
+    <p:sldId id="259" r:id="rId5"/>
+    <p:sldId id="260" r:id="rId6"/>
+    <p:sldId id="261" r:id="rId7"/>
+    <p:sldId id="262" r:id="rId8"/>
+    <p:sldId id="263" r:id="rId9"/>
+    <p:sldId id="264" r:id="rId10"/>
+    <p:sldId id="265" r:id="rId11"/>
+    <p:sldId id="266" r:id="rId12"/>
   </p:sldIdLst>
   <p:sldSz cx="12192000" cy="6858000"/>
   <p:notesSz cx="6858000" cy="9144000"/>
@@ -115,7 +116,7 @@
   </p:defaultTextStyle>
   <p:extLst>
     <p:ext uri="{EFAFB233-063F-42B5-8137-9DF3F51BA10A}">
-      <p15:sldGuideLst xmlns:p15="http://schemas.microsoft.com/office/powerpoint/2012/main">
+      <p15:sldGuideLst xmlns:p15="http://schemas.microsoft.com/office/powerpoint/2012/main" xmlns="">
         <p15:guide id="1" orient="horz" pos="2160" userDrawn="1">
           <p15:clr>
             <a:srgbClr val="A4A3A4"/>
@@ -181,8 +182,8 @@
           </a:prstGeom>
           <a:noFill/>
           <a:extLst>
-            <a:ext uri="{909E8E84-426E-40dd-AFC4-6F175D3DCCD1}">
-              <a14:hiddenFill xmlns:a14="http://schemas.microsoft.com/office/drawing/2010/main" xmlns="">
+            <a:ext uri="{909E8E84-426E-40DD-AFC4-6F175D3DCCD1}">
+              <a14:hiddenFill xmlns:a14="http://schemas.microsoft.com/office/drawing/2010/main">
                 <a:solidFill>
                   <a:srgbClr val="FFFFFF"/>
                 </a:solidFill>
@@ -241,8 +242,8 @@
               <a:noFill/>
             </a:ln>
             <a:extLst>
-              <a:ext uri="{91240B29-F687-4f45-9708-019B960494DF}">
-                <a14:hiddenLine xmlns:a14="http://schemas.microsoft.com/office/drawing/2010/main" xmlns="" w="9525">
+              <a:ext uri="{91240B29-F687-4F45-9708-019B960494DF}">
+                <a14:hiddenLine xmlns:a14="http://schemas.microsoft.com/office/drawing/2010/main" w="9525">
                   <a:solidFill>
                     <a:srgbClr val="000000"/>
                   </a:solidFill>
@@ -331,8 +332,8 @@
               <a:noFill/>
             </a:ln>
             <a:extLst>
-              <a:ext uri="{91240B29-F687-4f45-9708-019B960494DF}">
-                <a14:hiddenLine xmlns:a14="http://schemas.microsoft.com/office/drawing/2010/main" xmlns="" w="9525">
+              <a:ext uri="{91240B29-F687-4F45-9708-019B960494DF}">
+                <a14:hiddenLine xmlns:a14="http://schemas.microsoft.com/office/drawing/2010/main" w="9525">
                   <a:solidFill>
                     <a:srgbClr val="000000"/>
                   </a:solidFill>
@@ -421,8 +422,8 @@
               <a:noFill/>
             </a:ln>
             <a:extLst>
-              <a:ext uri="{91240B29-F687-4f45-9708-019B960494DF}">
-                <a14:hiddenLine xmlns:a14="http://schemas.microsoft.com/office/drawing/2010/main" xmlns="" w="9525">
+              <a:ext uri="{91240B29-F687-4F45-9708-019B960494DF}">
+                <a14:hiddenLine xmlns:a14="http://schemas.microsoft.com/office/drawing/2010/main" w="9525">
                   <a:solidFill>
                     <a:srgbClr val="000000"/>
                   </a:solidFill>
@@ -455,8 +456,8 @@
               <a:noFill/>
             </a:ln>
             <a:extLst>
-              <a:ext uri="{91240B29-F687-4f45-9708-019B960494DF}">
-                <a14:hiddenLine xmlns:a14="http://schemas.microsoft.com/office/drawing/2010/main" xmlns="" w="9525">
+              <a:ext uri="{91240B29-F687-4F45-9708-019B960494DF}">
+                <a14:hiddenLine xmlns:a14="http://schemas.microsoft.com/office/drawing/2010/main" w="9525">
                   <a:solidFill>
                     <a:srgbClr val="000000"/>
                   </a:solidFill>
@@ -545,8 +546,8 @@
               <a:noFill/>
             </a:ln>
             <a:extLst>
-              <a:ext uri="{91240B29-F687-4f45-9708-019B960494DF}">
-                <a14:hiddenLine xmlns:a14="http://schemas.microsoft.com/office/drawing/2010/main" xmlns="" w="9525">
+              <a:ext uri="{91240B29-F687-4F45-9708-019B960494DF}">
+                <a14:hiddenLine xmlns:a14="http://schemas.microsoft.com/office/drawing/2010/main" w="9525">
                   <a:solidFill>
                     <a:srgbClr val="000000"/>
                   </a:solidFill>
@@ -607,8 +608,8 @@
               <a:noFill/>
             </a:ln>
             <a:extLst>
-              <a:ext uri="{91240B29-F687-4f45-9708-019B960494DF}">
-                <a14:hiddenLine xmlns:a14="http://schemas.microsoft.com/office/drawing/2010/main" xmlns="" w="9525">
+              <a:ext uri="{91240B29-F687-4F45-9708-019B960494DF}">
+                <a14:hiddenLine xmlns:a14="http://schemas.microsoft.com/office/drawing/2010/main" w="9525">
                   <a:solidFill>
                     <a:srgbClr val="000000"/>
                   </a:solidFill>
@@ -669,8 +670,8 @@
               <a:noFill/>
             </a:ln>
             <a:extLst>
-              <a:ext uri="{91240B29-F687-4f45-9708-019B960494DF}">
-                <a14:hiddenLine xmlns:a14="http://schemas.microsoft.com/office/drawing/2010/main" xmlns="" w="9525">
+              <a:ext uri="{91240B29-F687-4F45-9708-019B960494DF}">
+                <a14:hiddenLine xmlns:a14="http://schemas.microsoft.com/office/drawing/2010/main" w="9525">
                   <a:solidFill>
                     <a:srgbClr val="000000"/>
                   </a:solidFill>
@@ -759,8 +760,8 @@
               <a:noFill/>
             </a:ln>
             <a:extLst>
-              <a:ext uri="{91240B29-F687-4f45-9708-019B960494DF}">
-                <a14:hiddenLine xmlns:a14="http://schemas.microsoft.com/office/drawing/2010/main" xmlns="" w="9525">
+              <a:ext uri="{91240B29-F687-4F45-9708-019B960494DF}">
+                <a14:hiddenLine xmlns:a14="http://schemas.microsoft.com/office/drawing/2010/main" w="9525">
                   <a:solidFill>
                     <a:srgbClr val="000000"/>
                   </a:solidFill>
@@ -821,8 +822,8 @@
               <a:noFill/>
             </a:ln>
             <a:extLst>
-              <a:ext uri="{91240B29-F687-4f45-9708-019B960494DF}">
-                <a14:hiddenLine xmlns:a14="http://schemas.microsoft.com/office/drawing/2010/main" xmlns="" w="9525">
+              <a:ext uri="{91240B29-F687-4F45-9708-019B960494DF}">
+                <a14:hiddenLine xmlns:a14="http://schemas.microsoft.com/office/drawing/2010/main" w="9525">
                   <a:solidFill>
                     <a:srgbClr val="000000"/>
                   </a:solidFill>
@@ -883,8 +884,8 @@
               <a:noFill/>
             </a:ln>
             <a:extLst>
-              <a:ext uri="{91240B29-F687-4f45-9708-019B960494DF}">
-                <a14:hiddenLine xmlns:a14="http://schemas.microsoft.com/office/drawing/2010/main" xmlns="" w="9525">
+              <a:ext uri="{91240B29-F687-4F45-9708-019B960494DF}">
+                <a14:hiddenLine xmlns:a14="http://schemas.microsoft.com/office/drawing/2010/main" w="9525">
                   <a:solidFill>
                     <a:srgbClr val="000000"/>
                   </a:solidFill>
@@ -973,8 +974,8 @@
               <a:noFill/>
             </a:ln>
             <a:extLst>
-              <a:ext uri="{91240B29-F687-4f45-9708-019B960494DF}">
-                <a14:hiddenLine xmlns:a14="http://schemas.microsoft.com/office/drawing/2010/main" xmlns="" w="9525">
+              <a:ext uri="{91240B29-F687-4F45-9708-019B960494DF}">
+                <a14:hiddenLine xmlns:a14="http://schemas.microsoft.com/office/drawing/2010/main" w="9525">
                   <a:solidFill>
                     <a:srgbClr val="000000"/>
                   </a:solidFill>
@@ -1063,8 +1064,8 @@
               <a:noFill/>
             </a:ln>
             <a:extLst>
-              <a:ext uri="{91240B29-F687-4f45-9708-019B960494DF}">
-                <a14:hiddenLine xmlns:a14="http://schemas.microsoft.com/office/drawing/2010/main" xmlns="" w="9525">
+              <a:ext uri="{91240B29-F687-4F45-9708-019B960494DF}">
+                <a14:hiddenLine xmlns:a14="http://schemas.microsoft.com/office/drawing/2010/main" w="9525">
                   <a:solidFill>
                     <a:srgbClr val="000000"/>
                   </a:solidFill>
@@ -1125,8 +1126,8 @@
               <a:noFill/>
             </a:ln>
             <a:extLst>
-              <a:ext uri="{91240B29-F687-4f45-9708-019B960494DF}">
-                <a14:hiddenLine xmlns:a14="http://schemas.microsoft.com/office/drawing/2010/main" xmlns="" w="9525">
+              <a:ext uri="{91240B29-F687-4F45-9708-019B960494DF}">
+                <a14:hiddenLine xmlns:a14="http://schemas.microsoft.com/office/drawing/2010/main" w="9525">
                   <a:solidFill>
                     <a:srgbClr val="000000"/>
                   </a:solidFill>
@@ -1235,8 +1236,8 @@
               <a:noFill/>
             </a:ln>
             <a:extLst>
-              <a:ext uri="{91240B29-F687-4f45-9708-019B960494DF}">
-                <a14:hiddenLine xmlns:a14="http://schemas.microsoft.com/office/drawing/2010/main" xmlns="" w="9525">
+              <a:ext uri="{91240B29-F687-4F45-9708-019B960494DF}">
+                <a14:hiddenLine xmlns:a14="http://schemas.microsoft.com/office/drawing/2010/main" w="9525">
                   <a:solidFill>
                     <a:srgbClr val="000000"/>
                   </a:solidFill>
@@ -1297,8 +1298,8 @@
               <a:noFill/>
             </a:ln>
             <a:extLst>
-              <a:ext uri="{91240B29-F687-4f45-9708-019B960494DF}">
-                <a14:hiddenLine xmlns:a14="http://schemas.microsoft.com/office/drawing/2010/main" xmlns="" w="9525">
+              <a:ext uri="{91240B29-F687-4F45-9708-019B960494DF}">
+                <a14:hiddenLine xmlns:a14="http://schemas.microsoft.com/office/drawing/2010/main" w="9525">
                   <a:solidFill>
                     <a:srgbClr val="000000"/>
                   </a:solidFill>
@@ -1387,8 +1388,8 @@
               <a:noFill/>
             </a:ln>
             <a:extLst>
-              <a:ext uri="{91240B29-F687-4f45-9708-019B960494DF}">
-                <a14:hiddenLine xmlns:a14="http://schemas.microsoft.com/office/drawing/2010/main" xmlns="" w="9525">
+              <a:ext uri="{91240B29-F687-4F45-9708-019B960494DF}">
+                <a14:hiddenLine xmlns:a14="http://schemas.microsoft.com/office/drawing/2010/main" w="9525">
                   <a:solidFill>
                     <a:srgbClr val="000000"/>
                   </a:solidFill>
@@ -1477,8 +1478,8 @@
               <a:noFill/>
             </a:ln>
             <a:extLst>
-              <a:ext uri="{91240B29-F687-4f45-9708-019B960494DF}">
-                <a14:hiddenLine xmlns:a14="http://schemas.microsoft.com/office/drawing/2010/main" xmlns="" w="9525">
+              <a:ext uri="{91240B29-F687-4F45-9708-019B960494DF}">
+                <a14:hiddenLine xmlns:a14="http://schemas.microsoft.com/office/drawing/2010/main" w="9525">
                   <a:solidFill>
                     <a:srgbClr val="000000"/>
                   </a:solidFill>
@@ -1539,8 +1540,8 @@
               <a:noFill/>
             </a:ln>
             <a:extLst>
-              <a:ext uri="{91240B29-F687-4f45-9708-019B960494DF}">
-                <a14:hiddenLine xmlns:a14="http://schemas.microsoft.com/office/drawing/2010/main" xmlns="" w="9525">
+              <a:ext uri="{91240B29-F687-4F45-9708-019B960494DF}">
+                <a14:hiddenLine xmlns:a14="http://schemas.microsoft.com/office/drawing/2010/main" w="9525">
                   <a:solidFill>
                     <a:srgbClr val="000000"/>
                   </a:solidFill>
@@ -1629,8 +1630,8 @@
               <a:noFill/>
             </a:ln>
             <a:extLst>
-              <a:ext uri="{91240B29-F687-4f45-9708-019B960494DF}">
-                <a14:hiddenLine xmlns:a14="http://schemas.microsoft.com/office/drawing/2010/main" xmlns="" w="9525">
+              <a:ext uri="{91240B29-F687-4F45-9708-019B960494DF}">
+                <a14:hiddenLine xmlns:a14="http://schemas.microsoft.com/office/drawing/2010/main" w="9525">
                   <a:solidFill>
                     <a:srgbClr val="000000"/>
                   </a:solidFill>
@@ -1719,8 +1720,8 @@
               <a:noFill/>
             </a:ln>
             <a:extLst>
-              <a:ext uri="{91240B29-F687-4f45-9708-019B960494DF}">
-                <a14:hiddenLine xmlns:a14="http://schemas.microsoft.com/office/drawing/2010/main" xmlns="" w="9525">
+              <a:ext uri="{91240B29-F687-4F45-9708-019B960494DF}">
+                <a14:hiddenLine xmlns:a14="http://schemas.microsoft.com/office/drawing/2010/main" w="9525">
                   <a:solidFill>
                     <a:srgbClr val="000000"/>
                   </a:solidFill>
@@ -1775,8 +1776,8 @@
               <a:noFill/>
             </a:ln>
             <a:extLst>
-              <a:ext uri="{91240B29-F687-4f45-9708-019B960494DF}">
-                <a14:hiddenLine xmlns:a14="http://schemas.microsoft.com/office/drawing/2010/main" xmlns="" w="9525">
+              <a:ext uri="{91240B29-F687-4F45-9708-019B960494DF}">
+                <a14:hiddenLine xmlns:a14="http://schemas.microsoft.com/office/drawing/2010/main" w="9525">
                   <a:solidFill>
                     <a:srgbClr val="000000"/>
                   </a:solidFill>
@@ -1865,8 +1866,8 @@
               <a:noFill/>
             </a:ln>
             <a:extLst>
-              <a:ext uri="{91240B29-F687-4f45-9708-019B960494DF}">
-                <a14:hiddenLine xmlns:a14="http://schemas.microsoft.com/office/drawing/2010/main" xmlns="" w="9525">
+              <a:ext uri="{91240B29-F687-4F45-9708-019B960494DF}">
+                <a14:hiddenLine xmlns:a14="http://schemas.microsoft.com/office/drawing/2010/main" w="9525">
                   <a:solidFill>
                     <a:srgbClr val="000000"/>
                   </a:solidFill>
@@ -1921,8 +1922,8 @@
               <a:noFill/>
             </a:ln>
             <a:extLst>
-              <a:ext uri="{91240B29-F687-4f45-9708-019B960494DF}">
-                <a14:hiddenLine xmlns:a14="http://schemas.microsoft.com/office/drawing/2010/main" xmlns="" w="9525">
+              <a:ext uri="{91240B29-F687-4F45-9708-019B960494DF}">
+                <a14:hiddenLine xmlns:a14="http://schemas.microsoft.com/office/drawing/2010/main" w="9525">
                   <a:solidFill>
                     <a:srgbClr val="000000"/>
                   </a:solidFill>
@@ -2011,8 +2012,8 @@
               <a:noFill/>
             </a:ln>
             <a:extLst>
-              <a:ext uri="{91240B29-F687-4f45-9708-019B960494DF}">
-                <a14:hiddenLine xmlns:a14="http://schemas.microsoft.com/office/drawing/2010/main" xmlns="" w="9525">
+              <a:ext uri="{91240B29-F687-4F45-9708-019B960494DF}">
+                <a14:hiddenLine xmlns:a14="http://schemas.microsoft.com/office/drawing/2010/main" w="9525">
                   <a:solidFill>
                     <a:srgbClr val="000000"/>
                   </a:solidFill>
@@ -2079,8 +2080,8 @@
               <a:noFill/>
             </a:ln>
             <a:extLst>
-              <a:ext uri="{91240B29-F687-4f45-9708-019B960494DF}">
-                <a14:hiddenLine xmlns:a14="http://schemas.microsoft.com/office/drawing/2010/main" xmlns="" w="9525">
+              <a:ext uri="{91240B29-F687-4F45-9708-019B960494DF}">
+                <a14:hiddenLine xmlns:a14="http://schemas.microsoft.com/office/drawing/2010/main" w="9525">
                   <a:solidFill>
                     <a:srgbClr val="000000"/>
                   </a:solidFill>
@@ -2169,8 +2170,8 @@
               <a:noFill/>
             </a:ln>
             <a:extLst>
-              <a:ext uri="{91240B29-F687-4f45-9708-019B960494DF}">
-                <a14:hiddenLine xmlns:a14="http://schemas.microsoft.com/office/drawing/2010/main" xmlns="" w="9525">
+              <a:ext uri="{91240B29-F687-4F45-9708-019B960494DF}">
+                <a14:hiddenLine xmlns:a14="http://schemas.microsoft.com/office/drawing/2010/main" w="9525">
                   <a:solidFill>
                     <a:srgbClr val="000000"/>
                   </a:solidFill>
@@ -2237,8 +2238,8 @@
               <a:noFill/>
             </a:ln>
             <a:extLst>
-              <a:ext uri="{91240B29-F687-4f45-9708-019B960494DF}">
-                <a14:hiddenLine xmlns:a14="http://schemas.microsoft.com/office/drawing/2010/main" xmlns="" w="9525">
+              <a:ext uri="{91240B29-F687-4F45-9708-019B960494DF}">
+                <a14:hiddenLine xmlns:a14="http://schemas.microsoft.com/office/drawing/2010/main" w="9525">
                   <a:solidFill>
                     <a:srgbClr val="000000"/>
                   </a:solidFill>
@@ -2327,8 +2328,8 @@
               <a:noFill/>
             </a:ln>
             <a:extLst>
-              <a:ext uri="{91240B29-F687-4f45-9708-019B960494DF}">
-                <a14:hiddenLine xmlns:a14="http://schemas.microsoft.com/office/drawing/2010/main" xmlns="" w="9525">
+              <a:ext uri="{91240B29-F687-4F45-9708-019B960494DF}">
+                <a14:hiddenLine xmlns:a14="http://schemas.microsoft.com/office/drawing/2010/main" w="9525">
                   <a:solidFill>
                     <a:srgbClr val="000000"/>
                   </a:solidFill>
@@ -2361,8 +2362,8 @@
               <a:noFill/>
             </a:ln>
             <a:extLst>
-              <a:ext uri="{91240B29-F687-4f45-9708-019B960494DF}">
-                <a14:hiddenLine xmlns:a14="http://schemas.microsoft.com/office/drawing/2010/main" xmlns="" w="9525">
+              <a:ext uri="{91240B29-F687-4F45-9708-019B960494DF}">
+                <a14:hiddenLine xmlns:a14="http://schemas.microsoft.com/office/drawing/2010/main" w="9525">
                   <a:solidFill>
                     <a:srgbClr val="000000"/>
                   </a:solidFill>
@@ -2451,8 +2452,8 @@
               <a:noFill/>
             </a:ln>
             <a:extLst>
-              <a:ext uri="{91240B29-F687-4f45-9708-019B960494DF}">
-                <a14:hiddenLine xmlns:a14="http://schemas.microsoft.com/office/drawing/2010/main" xmlns="" w="9525">
+              <a:ext uri="{91240B29-F687-4F45-9708-019B960494DF}">
+                <a14:hiddenLine xmlns:a14="http://schemas.microsoft.com/office/drawing/2010/main" w="9525">
                   <a:solidFill>
                     <a:srgbClr val="000000"/>
                   </a:solidFill>
@@ -2513,8 +2514,8 @@
               <a:noFill/>
             </a:ln>
             <a:extLst>
-              <a:ext uri="{91240B29-F687-4f45-9708-019B960494DF}">
-                <a14:hiddenLine xmlns:a14="http://schemas.microsoft.com/office/drawing/2010/main" xmlns="" w="9525">
+              <a:ext uri="{91240B29-F687-4F45-9708-019B960494DF}">
+                <a14:hiddenLine xmlns:a14="http://schemas.microsoft.com/office/drawing/2010/main" w="9525">
                   <a:solidFill>
                     <a:srgbClr val="000000"/>
                   </a:solidFill>
@@ -2575,8 +2576,8 @@
               <a:noFill/>
             </a:ln>
             <a:extLst>
-              <a:ext uri="{91240B29-F687-4f45-9708-019B960494DF}">
-                <a14:hiddenLine xmlns:a14="http://schemas.microsoft.com/office/drawing/2010/main" xmlns="" w="9525">
+              <a:ext uri="{91240B29-F687-4F45-9708-019B960494DF}">
+                <a14:hiddenLine xmlns:a14="http://schemas.microsoft.com/office/drawing/2010/main" w="9525">
                   <a:solidFill>
                     <a:srgbClr val="000000"/>
                   </a:solidFill>
@@ -2665,8 +2666,8 @@
               <a:noFill/>
             </a:ln>
             <a:extLst>
-              <a:ext uri="{91240B29-F687-4f45-9708-019B960494DF}">
-                <a14:hiddenLine xmlns:a14="http://schemas.microsoft.com/office/drawing/2010/main" xmlns="" w="9525">
+              <a:ext uri="{91240B29-F687-4F45-9708-019B960494DF}">
+                <a14:hiddenLine xmlns:a14="http://schemas.microsoft.com/office/drawing/2010/main" w="9525">
                   <a:solidFill>
                     <a:srgbClr val="000000"/>
                   </a:solidFill>
@@ -2733,8 +2734,8 @@
               <a:noFill/>
             </a:ln>
             <a:extLst>
-              <a:ext uri="{91240B29-F687-4f45-9708-019B960494DF}">
-                <a14:hiddenLine xmlns:a14="http://schemas.microsoft.com/office/drawing/2010/main" xmlns="" w="9525">
+              <a:ext uri="{91240B29-F687-4F45-9708-019B960494DF}">
+                <a14:hiddenLine xmlns:a14="http://schemas.microsoft.com/office/drawing/2010/main" w="9525">
                   <a:solidFill>
                     <a:srgbClr val="000000"/>
                   </a:solidFill>
@@ -2795,8 +2796,8 @@
               <a:noFill/>
             </a:ln>
             <a:extLst>
-              <a:ext uri="{91240B29-F687-4f45-9708-019B960494DF}">
-                <a14:hiddenLine xmlns:a14="http://schemas.microsoft.com/office/drawing/2010/main" xmlns="" w="9525">
+              <a:ext uri="{91240B29-F687-4F45-9708-019B960494DF}">
+                <a14:hiddenLine xmlns:a14="http://schemas.microsoft.com/office/drawing/2010/main" w="9525">
                   <a:solidFill>
                     <a:srgbClr val="000000"/>
                   </a:solidFill>
@@ -2885,8 +2886,8 @@
               <a:noFill/>
             </a:ln>
             <a:extLst>
-              <a:ext uri="{91240B29-F687-4f45-9708-019B960494DF}">
-                <a14:hiddenLine xmlns:a14="http://schemas.microsoft.com/office/drawing/2010/main" xmlns="" w="9525">
+              <a:ext uri="{91240B29-F687-4F45-9708-019B960494DF}">
+                <a14:hiddenLine xmlns:a14="http://schemas.microsoft.com/office/drawing/2010/main" w="9525">
                   <a:solidFill>
                     <a:srgbClr val="000000"/>
                   </a:solidFill>
@@ -2947,8 +2948,8 @@
               <a:noFill/>
             </a:ln>
             <a:extLst>
-              <a:ext uri="{91240B29-F687-4f45-9708-019B960494DF}">
-                <a14:hiddenLine xmlns:a14="http://schemas.microsoft.com/office/drawing/2010/main" xmlns="" w="9525">
+              <a:ext uri="{91240B29-F687-4F45-9708-019B960494DF}">
+                <a14:hiddenLine xmlns:a14="http://schemas.microsoft.com/office/drawing/2010/main" w="9525">
                   <a:solidFill>
                     <a:srgbClr val="000000"/>
                   </a:solidFill>
@@ -3037,8 +3038,8 @@
               <a:noFill/>
             </a:ln>
             <a:extLst>
-              <a:ext uri="{91240B29-F687-4f45-9708-019B960494DF}">
-                <a14:hiddenLine xmlns:a14="http://schemas.microsoft.com/office/drawing/2010/main" xmlns="" w="9525">
+              <a:ext uri="{91240B29-F687-4F45-9708-019B960494DF}">
+                <a14:hiddenLine xmlns:a14="http://schemas.microsoft.com/office/drawing/2010/main" w="9525">
                   <a:solidFill>
                     <a:srgbClr val="000000"/>
                   </a:solidFill>
@@ -3099,8 +3100,8 @@
               <a:noFill/>
             </a:ln>
             <a:extLst>
-              <a:ext uri="{91240B29-F687-4f45-9708-019B960494DF}">
-                <a14:hiddenLine xmlns:a14="http://schemas.microsoft.com/office/drawing/2010/main" xmlns="" w="9525">
+              <a:ext uri="{91240B29-F687-4F45-9708-019B960494DF}">
+                <a14:hiddenLine xmlns:a14="http://schemas.microsoft.com/office/drawing/2010/main" w="9525">
                   <a:solidFill>
                     <a:srgbClr val="000000"/>
                   </a:solidFill>
@@ -3189,8 +3190,8 @@
               <a:noFill/>
             </a:ln>
             <a:extLst>
-              <a:ext uri="{91240B29-F687-4f45-9708-019B960494DF}">
-                <a14:hiddenLine xmlns:a14="http://schemas.microsoft.com/office/drawing/2010/main" xmlns="" w="9525">
+              <a:ext uri="{91240B29-F687-4F45-9708-019B960494DF}">
+                <a14:hiddenLine xmlns:a14="http://schemas.microsoft.com/office/drawing/2010/main" w="9525">
                   <a:solidFill>
                     <a:srgbClr val="000000"/>
                   </a:solidFill>
@@ -3223,8 +3224,8 @@
               <a:noFill/>
             </a:ln>
             <a:extLst>
-              <a:ext uri="{91240B29-F687-4f45-9708-019B960494DF}">
-                <a14:hiddenLine xmlns:a14="http://schemas.microsoft.com/office/drawing/2010/main" xmlns="" w="9525">
+              <a:ext uri="{91240B29-F687-4F45-9708-019B960494DF}">
+                <a14:hiddenLine xmlns:a14="http://schemas.microsoft.com/office/drawing/2010/main" w="9525">
                   <a:solidFill>
                     <a:srgbClr val="000000"/>
                   </a:solidFill>
@@ -3288,8 +3289,8 @@
               <a:noFill/>
             </a:ln>
             <a:extLst>
-              <a:ext uri="{91240B29-F687-4f45-9708-019B960494DF}">
-                <a14:hiddenLine xmlns:a14="http://schemas.microsoft.com/office/drawing/2010/main" xmlns="" w="9525">
+              <a:ext uri="{91240B29-F687-4F45-9708-019B960494DF}">
+                <a14:hiddenLine xmlns:a14="http://schemas.microsoft.com/office/drawing/2010/main" w="9525">
                   <a:solidFill>
                     <a:srgbClr val="000000"/>
                   </a:solidFill>
@@ -3378,8 +3379,8 @@
               <a:noFill/>
             </a:ln>
             <a:extLst>
-              <a:ext uri="{91240B29-F687-4f45-9708-019B960494DF}">
-                <a14:hiddenLine xmlns:a14="http://schemas.microsoft.com/office/drawing/2010/main" xmlns="" w="9525">
+              <a:ext uri="{91240B29-F687-4F45-9708-019B960494DF}">
+                <a14:hiddenLine xmlns:a14="http://schemas.microsoft.com/office/drawing/2010/main" w="9525">
                   <a:solidFill>
                     <a:srgbClr val="000000"/>
                   </a:solidFill>
@@ -3440,8 +3441,8 @@
               <a:noFill/>
             </a:ln>
             <a:extLst>
-              <a:ext uri="{91240B29-F687-4f45-9708-019B960494DF}">
-                <a14:hiddenLine xmlns:a14="http://schemas.microsoft.com/office/drawing/2010/main" xmlns="" w="9525">
+              <a:ext uri="{91240B29-F687-4F45-9708-019B960494DF}">
+                <a14:hiddenLine xmlns:a14="http://schemas.microsoft.com/office/drawing/2010/main" w="9525">
                   <a:solidFill>
                     <a:srgbClr val="000000"/>
                   </a:solidFill>
@@ -3530,8 +3531,8 @@
               <a:noFill/>
             </a:ln>
             <a:extLst>
-              <a:ext uri="{91240B29-F687-4f45-9708-019B960494DF}">
-                <a14:hiddenLine xmlns:a14="http://schemas.microsoft.com/office/drawing/2010/main" xmlns="" w="9525">
+              <a:ext uri="{91240B29-F687-4F45-9708-019B960494DF}">
+                <a14:hiddenLine xmlns:a14="http://schemas.microsoft.com/office/drawing/2010/main" w="9525">
                   <a:solidFill>
                     <a:srgbClr val="000000"/>
                   </a:solidFill>
@@ -3620,8 +3621,8 @@
               <a:noFill/>
             </a:ln>
             <a:extLst>
-              <a:ext uri="{91240B29-F687-4f45-9708-019B960494DF}">
-                <a14:hiddenLine xmlns:a14="http://schemas.microsoft.com/office/drawing/2010/main" xmlns="" w="9525">
+              <a:ext uri="{91240B29-F687-4F45-9708-019B960494DF}">
+                <a14:hiddenLine xmlns:a14="http://schemas.microsoft.com/office/drawing/2010/main" w="9525">
                   <a:solidFill>
                     <a:srgbClr val="000000"/>
                   </a:solidFill>
@@ -3685,8 +3686,8 @@
               <a:noFill/>
             </a:ln>
             <a:extLst>
-              <a:ext uri="{91240B29-F687-4f45-9708-019B960494DF}">
-                <a14:hiddenLine xmlns:a14="http://schemas.microsoft.com/office/drawing/2010/main" xmlns="" w="9525">
+              <a:ext uri="{91240B29-F687-4F45-9708-019B960494DF}">
+                <a14:hiddenLine xmlns:a14="http://schemas.microsoft.com/office/drawing/2010/main" w="9525">
                   <a:solidFill>
                     <a:srgbClr val="000000"/>
                   </a:solidFill>
@@ -3747,8 +3748,8 @@
               <a:noFill/>
             </a:ln>
             <a:extLst>
-              <a:ext uri="{91240B29-F687-4f45-9708-019B960494DF}">
-                <a14:hiddenLine xmlns:a14="http://schemas.microsoft.com/office/drawing/2010/main" xmlns="" w="9525">
+              <a:ext uri="{91240B29-F687-4F45-9708-019B960494DF}">
+                <a14:hiddenLine xmlns:a14="http://schemas.microsoft.com/office/drawing/2010/main" w="9525">
                   <a:solidFill>
                     <a:srgbClr val="000000"/>
                   </a:solidFill>
@@ -3837,8 +3838,8 @@
               <a:noFill/>
             </a:ln>
             <a:extLst>
-              <a:ext uri="{91240B29-F687-4f45-9708-019B960494DF}">
-                <a14:hiddenLine xmlns:a14="http://schemas.microsoft.com/office/drawing/2010/main" xmlns="" w="9525">
+              <a:ext uri="{91240B29-F687-4F45-9708-019B960494DF}">
+                <a14:hiddenLine xmlns:a14="http://schemas.microsoft.com/office/drawing/2010/main" w="9525">
                   <a:solidFill>
                     <a:srgbClr val="000000"/>
                   </a:solidFill>
@@ -3927,8 +3928,8 @@
               <a:noFill/>
             </a:ln>
             <a:extLst>
-              <a:ext uri="{91240B29-F687-4f45-9708-019B960494DF}">
-                <a14:hiddenLine xmlns:a14="http://schemas.microsoft.com/office/drawing/2010/main" xmlns="" w="9525">
+              <a:ext uri="{91240B29-F687-4F45-9708-019B960494DF}">
+                <a14:hiddenLine xmlns:a14="http://schemas.microsoft.com/office/drawing/2010/main" w="9525">
                   <a:solidFill>
                     <a:srgbClr val="000000"/>
                   </a:solidFill>
@@ -3989,8 +3990,8 @@
               <a:noFill/>
             </a:ln>
             <a:extLst>
-              <a:ext uri="{91240B29-F687-4f45-9708-019B960494DF}">
-                <a14:hiddenLine xmlns:a14="http://schemas.microsoft.com/office/drawing/2010/main" xmlns="" w="9525">
+              <a:ext uri="{91240B29-F687-4F45-9708-019B960494DF}">
+                <a14:hiddenLine xmlns:a14="http://schemas.microsoft.com/office/drawing/2010/main" w="9525">
                   <a:solidFill>
                     <a:srgbClr val="000000"/>
                   </a:solidFill>
@@ -4109,8 +4110,8 @@
               <a:noFill/>
             </a:ln>
             <a:extLst>
-              <a:ext uri="{91240B29-F687-4f45-9708-019B960494DF}">
-                <a14:hiddenLine xmlns:a14="http://schemas.microsoft.com/office/drawing/2010/main" xmlns="" w="9525">
+              <a:ext uri="{91240B29-F687-4F45-9708-019B960494DF}">
+                <a14:hiddenLine xmlns:a14="http://schemas.microsoft.com/office/drawing/2010/main" w="9525">
                   <a:solidFill>
                     <a:srgbClr val="000000"/>
                   </a:solidFill>
@@ -4177,8 +4178,8 @@
               <a:noFill/>
             </a:ln>
             <a:extLst>
-              <a:ext uri="{91240B29-F687-4f45-9708-019B960494DF}">
-                <a14:hiddenLine xmlns:a14="http://schemas.microsoft.com/office/drawing/2010/main" xmlns="" w="9525">
+              <a:ext uri="{91240B29-F687-4F45-9708-019B960494DF}">
+                <a14:hiddenLine xmlns:a14="http://schemas.microsoft.com/office/drawing/2010/main" w="9525">
                   <a:solidFill>
                     <a:srgbClr val="000000"/>
                   </a:solidFill>
@@ -4267,8 +4268,8 @@
               <a:noFill/>
             </a:ln>
             <a:extLst>
-              <a:ext uri="{91240B29-F687-4f45-9708-019B960494DF}">
-                <a14:hiddenLine xmlns:a14="http://schemas.microsoft.com/office/drawing/2010/main" xmlns="" w="9525">
+              <a:ext uri="{91240B29-F687-4F45-9708-019B960494DF}">
+                <a14:hiddenLine xmlns:a14="http://schemas.microsoft.com/office/drawing/2010/main" w="9525">
                   <a:solidFill>
                     <a:srgbClr val="000000"/>
                   </a:solidFill>
@@ -4408,7 +4409,7 @@
           <a:p>
             <a:fld id="{48A87A34-81AB-432B-8DAE-1953F412C126}" type="datetimeFigureOut">
               <a:rPr lang="en-US" dirty="0"/>
-              <a:t>6/9/19</a:t>
+              <a:t>6/10/2019</a:t>
             </a:fld>
             <a:endParaRPr lang="en-US" dirty="0"/>
           </a:p>
@@ -4670,7 +4671,7 @@
           <a:p>
             <a:fld id="{48A87A34-81AB-432B-8DAE-1953F412C126}" type="datetimeFigureOut">
               <a:rPr lang="en-US" dirty="0"/>
-              <a:t>6/9/19</a:t>
+              <a:t>6/10/2019</a:t>
             </a:fld>
             <a:endParaRPr lang="en-US" dirty="0"/>
           </a:p>
@@ -4861,7 +4862,7 @@
           <a:p>
             <a:fld id="{48A87A34-81AB-432B-8DAE-1953F412C126}" type="datetimeFigureOut">
               <a:rPr lang="en-US" dirty="0"/>
-              <a:t>6/9/19</a:t>
+              <a:t>6/10/2019</a:t>
             </a:fld>
             <a:endParaRPr lang="en-US" dirty="0"/>
           </a:p>
@@ -5119,7 +5120,7 @@
           <a:p>
             <a:fld id="{48A87A34-81AB-432B-8DAE-1953F412C126}" type="datetimeFigureOut">
               <a:rPr lang="en-US" dirty="0"/>
-              <a:t>6/9/19</a:t>
+              <a:t>6/10/2019</a:t>
             </a:fld>
             <a:endParaRPr lang="en-US" dirty="0"/>
           </a:p>
@@ -5548,7 +5549,7 @@
           <a:p>
             <a:fld id="{48A87A34-81AB-432B-8DAE-1953F412C126}" type="datetimeFigureOut">
               <a:rPr lang="en-US" dirty="0"/>
-              <a:t>6/9/19</a:t>
+              <a:t>6/10/2019</a:t>
             </a:fld>
             <a:endParaRPr lang="en-US" dirty="0"/>
           </a:p>
@@ -6089,7 +6090,7 @@
           <a:p>
             <a:fld id="{48A87A34-81AB-432B-8DAE-1953F412C126}" type="datetimeFigureOut">
               <a:rPr lang="en-US" dirty="0"/>
-              <a:t>6/9/19</a:t>
+              <a:t>6/10/2019</a:t>
             </a:fld>
             <a:endParaRPr lang="en-US" dirty="0"/>
           </a:p>
@@ -6804,7 +6805,7 @@
           <a:p>
             <a:fld id="{48A87A34-81AB-432B-8DAE-1953F412C126}" type="datetimeFigureOut">
               <a:rPr lang="en-US" dirty="0"/>
-              <a:t>6/9/19</a:t>
+              <a:t>6/10/2019</a:t>
             </a:fld>
             <a:endParaRPr lang="en-US" dirty="0"/>
           </a:p>
@@ -6969,7 +6970,7 @@
           <a:p>
             <a:fld id="{48A87A34-81AB-432B-8DAE-1953F412C126}" type="datetimeFigureOut">
               <a:rPr lang="en-US" dirty="0"/>
-              <a:t>6/9/19</a:t>
+              <a:t>6/10/2019</a:t>
             </a:fld>
             <a:endParaRPr lang="en-US" dirty="0"/>
           </a:p>
@@ -7144,7 +7145,7 @@
           <a:p>
             <a:fld id="{48A87A34-81AB-432B-8DAE-1953F412C126}" type="datetimeFigureOut">
               <a:rPr lang="en-US" dirty="0"/>
-              <a:t>6/9/19</a:t>
+              <a:t>6/10/2019</a:t>
             </a:fld>
             <a:endParaRPr lang="en-US" dirty="0"/>
           </a:p>
@@ -7309,7 +7310,7 @@
           <a:p>
             <a:fld id="{48A87A34-81AB-432B-8DAE-1953F412C126}" type="datetimeFigureOut">
               <a:rPr lang="en-US" dirty="0"/>
-              <a:t>6/9/19</a:t>
+              <a:t>6/10/2019</a:t>
             </a:fld>
             <a:endParaRPr lang="en-US" dirty="0"/>
           </a:p>
@@ -7554,7 +7555,7 @@
           <a:p>
             <a:fld id="{48A87A34-81AB-432B-8DAE-1953F412C126}" type="datetimeFigureOut">
               <a:rPr lang="en-US" dirty="0"/>
-              <a:t>6/9/19</a:t>
+              <a:t>6/10/2019</a:t>
             </a:fld>
             <a:endParaRPr lang="en-US" dirty="0"/>
           </a:p>
@@ -7781,7 +7782,7 @@
           <a:p>
             <a:fld id="{48A87A34-81AB-432B-8DAE-1953F412C126}" type="datetimeFigureOut">
               <a:rPr lang="en-US" dirty="0"/>
-              <a:t>6/9/19</a:t>
+              <a:t>6/10/2019</a:t>
             </a:fld>
             <a:endParaRPr lang="en-US" dirty="0"/>
           </a:p>
@@ -8157,7 +8158,7 @@
           <a:p>
             <a:fld id="{48A87A34-81AB-432B-8DAE-1953F412C126}" type="datetimeFigureOut">
               <a:rPr lang="en-US" dirty="0"/>
-              <a:t>6/9/19</a:t>
+              <a:t>6/10/2019</a:t>
             </a:fld>
             <a:endParaRPr lang="en-US" dirty="0"/>
           </a:p>
@@ -8270,7 +8271,7 @@
           <a:p>
             <a:fld id="{48A87A34-81AB-432B-8DAE-1953F412C126}" type="datetimeFigureOut">
               <a:rPr lang="en-US" dirty="0"/>
-              <a:t>6/9/19</a:t>
+              <a:t>6/10/2019</a:t>
             </a:fld>
             <a:endParaRPr lang="en-US" dirty="0"/>
           </a:p>
@@ -8360,7 +8361,7 @@
           <a:p>
             <a:fld id="{48A87A34-81AB-432B-8DAE-1953F412C126}" type="datetimeFigureOut">
               <a:rPr lang="en-US" dirty="0"/>
-              <a:t>6/9/19</a:t>
+              <a:t>6/10/2019</a:t>
             </a:fld>
             <a:endParaRPr lang="en-US" dirty="0"/>
           </a:p>
@@ -8604,7 +8605,7 @@
           <a:p>
             <a:fld id="{48A87A34-81AB-432B-8DAE-1953F412C126}" type="datetimeFigureOut">
               <a:rPr lang="en-US" dirty="0"/>
-              <a:t>6/9/19</a:t>
+              <a:t>6/10/2019</a:t>
             </a:fld>
             <a:endParaRPr lang="en-US" dirty="0"/>
           </a:p>
@@ -8879,7 +8880,7 @@
           <a:p>
             <a:fld id="{48A87A34-81AB-432B-8DAE-1953F412C126}" type="datetimeFigureOut">
               <a:rPr lang="en-US" dirty="0"/>
-              <a:t>6/9/19</a:t>
+              <a:t>6/10/2019</a:t>
             </a:fld>
             <a:endParaRPr lang="en-US" dirty="0"/>
           </a:p>
@@ -8989,8 +8990,8 @@
           </a:prstGeom>
           <a:noFill/>
           <a:extLst>
-            <a:ext uri="{909E8E84-426E-40dd-AFC4-6F175D3DCCD1}">
-              <a14:hiddenFill xmlns:a14="http://schemas.microsoft.com/office/drawing/2010/main" xmlns="">
+            <a:ext uri="{909E8E84-426E-40DD-AFC4-6F175D3DCCD1}">
+              <a14:hiddenFill xmlns:a14="http://schemas.microsoft.com/office/drawing/2010/main">
                 <a:solidFill>
                   <a:srgbClr val="FFFFFF"/>
                 </a:solidFill>
@@ -9063,8 +9064,8 @@
                 <a:noFill/>
               </a:ln>
               <a:extLst>
-                <a:ext uri="{91240B29-F687-4f45-9708-019B960494DF}">
-                  <a14:hiddenLine xmlns:a14="http://schemas.microsoft.com/office/drawing/2010/main" xmlns="" w="9525">
+                <a:ext uri="{91240B29-F687-4F45-9708-019B960494DF}">
+                  <a14:hiddenLine xmlns:a14="http://schemas.microsoft.com/office/drawing/2010/main" w="9525">
                     <a:solidFill>
                       <a:srgbClr val="000000"/>
                     </a:solidFill>
@@ -9153,8 +9154,8 @@
                 <a:noFill/>
               </a:ln>
               <a:extLst>
-                <a:ext uri="{91240B29-F687-4f45-9708-019B960494DF}">
-                  <a14:hiddenLine xmlns:a14="http://schemas.microsoft.com/office/drawing/2010/main" xmlns="" w="9525">
+                <a:ext uri="{91240B29-F687-4F45-9708-019B960494DF}">
+                  <a14:hiddenLine xmlns:a14="http://schemas.microsoft.com/office/drawing/2010/main" w="9525">
                     <a:solidFill>
                       <a:srgbClr val="000000"/>
                     </a:solidFill>
@@ -9243,8 +9244,8 @@
                 <a:noFill/>
               </a:ln>
               <a:extLst>
-                <a:ext uri="{91240B29-F687-4f45-9708-019B960494DF}">
-                  <a14:hiddenLine xmlns:a14="http://schemas.microsoft.com/office/drawing/2010/main" xmlns="" w="9525">
+                <a:ext uri="{91240B29-F687-4F45-9708-019B960494DF}">
+                  <a14:hiddenLine xmlns:a14="http://schemas.microsoft.com/office/drawing/2010/main" w="9525">
                     <a:solidFill>
                       <a:srgbClr val="000000"/>
                     </a:solidFill>
@@ -9305,8 +9306,8 @@
                 <a:noFill/>
               </a:ln>
               <a:extLst>
-                <a:ext uri="{91240B29-F687-4f45-9708-019B960494DF}">
-                  <a14:hiddenLine xmlns:a14="http://schemas.microsoft.com/office/drawing/2010/main" xmlns="" w="9525">
+                <a:ext uri="{91240B29-F687-4F45-9708-019B960494DF}">
+                  <a14:hiddenLine xmlns:a14="http://schemas.microsoft.com/office/drawing/2010/main" w="9525">
                     <a:solidFill>
                       <a:srgbClr val="000000"/>
                     </a:solidFill>
@@ -9395,8 +9396,8 @@
                 <a:noFill/>
               </a:ln>
               <a:extLst>
-                <a:ext uri="{91240B29-F687-4f45-9708-019B960494DF}">
-                  <a14:hiddenLine xmlns:a14="http://schemas.microsoft.com/office/drawing/2010/main" xmlns="" w="9525">
+                <a:ext uri="{91240B29-F687-4F45-9708-019B960494DF}">
+                  <a14:hiddenLine xmlns:a14="http://schemas.microsoft.com/office/drawing/2010/main" w="9525">
                     <a:solidFill>
                       <a:srgbClr val="000000"/>
                     </a:solidFill>
@@ -9457,8 +9458,8 @@
                 <a:noFill/>
               </a:ln>
               <a:extLst>
-                <a:ext uri="{91240B29-F687-4f45-9708-019B960494DF}">
-                  <a14:hiddenLine xmlns:a14="http://schemas.microsoft.com/office/drawing/2010/main" xmlns="" w="9525">
+                <a:ext uri="{91240B29-F687-4F45-9708-019B960494DF}">
+                  <a14:hiddenLine xmlns:a14="http://schemas.microsoft.com/office/drawing/2010/main" w="9525">
                     <a:solidFill>
                       <a:srgbClr val="000000"/>
                     </a:solidFill>
@@ -9519,8 +9520,8 @@
                 <a:noFill/>
               </a:ln>
               <a:extLst>
-                <a:ext uri="{91240B29-F687-4f45-9708-019B960494DF}">
-                  <a14:hiddenLine xmlns:a14="http://schemas.microsoft.com/office/drawing/2010/main" xmlns="" w="9525">
+                <a:ext uri="{91240B29-F687-4F45-9708-019B960494DF}">
+                  <a14:hiddenLine xmlns:a14="http://schemas.microsoft.com/office/drawing/2010/main" w="9525">
                     <a:solidFill>
                       <a:srgbClr val="000000"/>
                     </a:solidFill>
@@ -9609,8 +9610,8 @@
                 <a:noFill/>
               </a:ln>
               <a:extLst>
-                <a:ext uri="{91240B29-F687-4f45-9708-019B960494DF}">
-                  <a14:hiddenLine xmlns:a14="http://schemas.microsoft.com/office/drawing/2010/main" xmlns="" w="9525">
+                <a:ext uri="{91240B29-F687-4F45-9708-019B960494DF}">
+                  <a14:hiddenLine xmlns:a14="http://schemas.microsoft.com/office/drawing/2010/main" w="9525">
                     <a:solidFill>
                       <a:srgbClr val="000000"/>
                     </a:solidFill>
@@ -9699,8 +9700,8 @@
                 <a:noFill/>
               </a:ln>
               <a:extLst>
-                <a:ext uri="{91240B29-F687-4f45-9708-019B960494DF}">
-                  <a14:hiddenLine xmlns:a14="http://schemas.microsoft.com/office/drawing/2010/main" xmlns="" w="9525">
+                <a:ext uri="{91240B29-F687-4F45-9708-019B960494DF}">
+                  <a14:hiddenLine xmlns:a14="http://schemas.microsoft.com/office/drawing/2010/main" w="9525">
                     <a:solidFill>
                       <a:srgbClr val="000000"/>
                     </a:solidFill>
@@ -9761,8 +9762,8 @@
                 <a:noFill/>
               </a:ln>
               <a:extLst>
-                <a:ext uri="{91240B29-F687-4f45-9708-019B960494DF}">
-                  <a14:hiddenLine xmlns:a14="http://schemas.microsoft.com/office/drawing/2010/main" xmlns="" w="9525">
+                <a:ext uri="{91240B29-F687-4F45-9708-019B960494DF}">
+                  <a14:hiddenLine xmlns:a14="http://schemas.microsoft.com/office/drawing/2010/main" w="9525">
                     <a:solidFill>
                       <a:srgbClr val="000000"/>
                     </a:solidFill>
@@ -9871,8 +9872,8 @@
                 <a:noFill/>
               </a:ln>
               <a:extLst>
-                <a:ext uri="{91240B29-F687-4f45-9708-019B960494DF}">
-                  <a14:hiddenLine xmlns:a14="http://schemas.microsoft.com/office/drawing/2010/main" xmlns="" w="9525">
+                <a:ext uri="{91240B29-F687-4F45-9708-019B960494DF}">
+                  <a14:hiddenLine xmlns:a14="http://schemas.microsoft.com/office/drawing/2010/main" w="9525">
                     <a:solidFill>
                       <a:srgbClr val="000000"/>
                     </a:solidFill>
@@ -9955,8 +9956,8 @@
                 <a:noFill/>
               </a:ln>
               <a:extLst>
-                <a:ext uri="{91240B29-F687-4f45-9708-019B960494DF}">
-                  <a14:hiddenLine xmlns:a14="http://schemas.microsoft.com/office/drawing/2010/main" xmlns="" w="9525">
+                <a:ext uri="{91240B29-F687-4F45-9708-019B960494DF}">
+                  <a14:hiddenLine xmlns:a14="http://schemas.microsoft.com/office/drawing/2010/main" w="9525">
                     <a:solidFill>
                       <a:srgbClr val="000000"/>
                     </a:solidFill>
@@ -10017,8 +10018,8 @@
                 <a:noFill/>
               </a:ln>
               <a:extLst>
-                <a:ext uri="{91240B29-F687-4f45-9708-019B960494DF}">
-                  <a14:hiddenLine xmlns:a14="http://schemas.microsoft.com/office/drawing/2010/main" xmlns="" w="9525">
+                <a:ext uri="{91240B29-F687-4F45-9708-019B960494DF}">
+                  <a14:hiddenLine xmlns:a14="http://schemas.microsoft.com/office/drawing/2010/main" w="9525">
                     <a:solidFill>
                       <a:srgbClr val="000000"/>
                     </a:solidFill>
@@ -10079,8 +10080,8 @@
                 <a:noFill/>
               </a:ln>
               <a:extLst>
-                <a:ext uri="{91240B29-F687-4f45-9708-019B960494DF}">
-                  <a14:hiddenLine xmlns:a14="http://schemas.microsoft.com/office/drawing/2010/main" xmlns="" w="9525">
+                <a:ext uri="{91240B29-F687-4F45-9708-019B960494DF}">
+                  <a14:hiddenLine xmlns:a14="http://schemas.microsoft.com/office/drawing/2010/main" w="9525">
                     <a:solidFill>
                       <a:srgbClr val="000000"/>
                     </a:solidFill>
@@ -10169,8 +10170,8 @@
                 <a:noFill/>
               </a:ln>
               <a:extLst>
-                <a:ext uri="{91240B29-F687-4f45-9708-019B960494DF}">
-                  <a14:hiddenLine xmlns:a14="http://schemas.microsoft.com/office/drawing/2010/main" xmlns="" w="9525">
+                <a:ext uri="{91240B29-F687-4F45-9708-019B960494DF}">
+                  <a14:hiddenLine xmlns:a14="http://schemas.microsoft.com/office/drawing/2010/main" w="9525">
                     <a:solidFill>
                       <a:srgbClr val="000000"/>
                     </a:solidFill>
@@ -10203,8 +10204,8 @@
                 <a:noFill/>
               </a:ln>
               <a:extLst>
-                <a:ext uri="{91240B29-F687-4f45-9708-019B960494DF}">
-                  <a14:hiddenLine xmlns:a14="http://schemas.microsoft.com/office/drawing/2010/main" xmlns="" w="9525">
+                <a:ext uri="{91240B29-F687-4F45-9708-019B960494DF}">
+                  <a14:hiddenLine xmlns:a14="http://schemas.microsoft.com/office/drawing/2010/main" w="9525">
                     <a:solidFill>
                       <a:srgbClr val="000000"/>
                     </a:solidFill>
@@ -10268,8 +10269,8 @@
                 <a:noFill/>
               </a:ln>
               <a:extLst>
-                <a:ext uri="{91240B29-F687-4f45-9708-019B960494DF}">
-                  <a14:hiddenLine xmlns:a14="http://schemas.microsoft.com/office/drawing/2010/main" xmlns="" w="9525">
+                <a:ext uri="{91240B29-F687-4F45-9708-019B960494DF}">
+                  <a14:hiddenLine xmlns:a14="http://schemas.microsoft.com/office/drawing/2010/main" w="9525">
                     <a:solidFill>
                       <a:srgbClr val="000000"/>
                     </a:solidFill>
@@ -10358,8 +10359,8 @@
                 <a:noFill/>
               </a:ln>
               <a:extLst>
-                <a:ext uri="{91240B29-F687-4f45-9708-019B960494DF}">
-                  <a14:hiddenLine xmlns:a14="http://schemas.microsoft.com/office/drawing/2010/main" xmlns="" w="9525">
+                <a:ext uri="{91240B29-F687-4F45-9708-019B960494DF}">
+                  <a14:hiddenLine xmlns:a14="http://schemas.microsoft.com/office/drawing/2010/main" w="9525">
                     <a:solidFill>
                       <a:srgbClr val="000000"/>
                     </a:solidFill>
@@ -10420,8 +10421,8 @@
                 <a:noFill/>
               </a:ln>
               <a:extLst>
-                <a:ext uri="{91240B29-F687-4f45-9708-019B960494DF}">
-                  <a14:hiddenLine xmlns:a14="http://schemas.microsoft.com/office/drawing/2010/main" xmlns="" w="9525">
+                <a:ext uri="{91240B29-F687-4F45-9708-019B960494DF}">
+                  <a14:hiddenLine xmlns:a14="http://schemas.microsoft.com/office/drawing/2010/main" w="9525">
                     <a:solidFill>
                       <a:srgbClr val="000000"/>
                     </a:solidFill>
@@ -10510,8 +10511,8 @@
                 <a:noFill/>
               </a:ln>
               <a:extLst>
-                <a:ext uri="{91240B29-F687-4f45-9708-019B960494DF}">
-                  <a14:hiddenLine xmlns:a14="http://schemas.microsoft.com/office/drawing/2010/main" xmlns="" w="9525">
+                <a:ext uri="{91240B29-F687-4F45-9708-019B960494DF}">
+                  <a14:hiddenLine xmlns:a14="http://schemas.microsoft.com/office/drawing/2010/main" w="9525">
                     <a:solidFill>
                       <a:srgbClr val="000000"/>
                     </a:solidFill>
@@ -10575,8 +10576,8 @@
                 <a:noFill/>
               </a:ln>
               <a:extLst>
-                <a:ext uri="{91240B29-F687-4f45-9708-019B960494DF}">
-                  <a14:hiddenLine xmlns:a14="http://schemas.microsoft.com/office/drawing/2010/main" xmlns="" w="9525">
+                <a:ext uri="{91240B29-F687-4F45-9708-019B960494DF}">
+                  <a14:hiddenLine xmlns:a14="http://schemas.microsoft.com/office/drawing/2010/main" w="9525">
                     <a:solidFill>
                       <a:srgbClr val="000000"/>
                     </a:solidFill>
@@ -10637,8 +10638,8 @@
                 <a:noFill/>
               </a:ln>
               <a:extLst>
-                <a:ext uri="{91240B29-F687-4f45-9708-019B960494DF}">
-                  <a14:hiddenLine xmlns:a14="http://schemas.microsoft.com/office/drawing/2010/main" xmlns="" w="9525">
+                <a:ext uri="{91240B29-F687-4F45-9708-019B960494DF}">
+                  <a14:hiddenLine xmlns:a14="http://schemas.microsoft.com/office/drawing/2010/main" w="9525">
                     <a:solidFill>
                       <a:srgbClr val="000000"/>
                     </a:solidFill>
@@ -10727,8 +10728,8 @@
                 <a:noFill/>
               </a:ln>
               <a:extLst>
-                <a:ext uri="{91240B29-F687-4f45-9708-019B960494DF}">
-                  <a14:hiddenLine xmlns:a14="http://schemas.microsoft.com/office/drawing/2010/main" xmlns="" w="9525">
+                <a:ext uri="{91240B29-F687-4F45-9708-019B960494DF}">
+                  <a14:hiddenLine xmlns:a14="http://schemas.microsoft.com/office/drawing/2010/main" w="9525">
                     <a:solidFill>
                       <a:srgbClr val="000000"/>
                     </a:solidFill>
@@ -10817,8 +10818,8 @@
                 <a:noFill/>
               </a:ln>
               <a:extLst>
-                <a:ext uri="{91240B29-F687-4f45-9708-019B960494DF}">
-                  <a14:hiddenLine xmlns:a14="http://schemas.microsoft.com/office/drawing/2010/main" xmlns="" w="9525">
+                <a:ext uri="{91240B29-F687-4F45-9708-019B960494DF}">
+                  <a14:hiddenLine xmlns:a14="http://schemas.microsoft.com/office/drawing/2010/main" w="9525">
                     <a:solidFill>
                       <a:srgbClr val="000000"/>
                     </a:solidFill>
@@ -10882,8 +10883,8 @@
                 <a:noFill/>
               </a:ln>
               <a:extLst>
-                <a:ext uri="{91240B29-F687-4f45-9708-019B960494DF}">
-                  <a14:hiddenLine xmlns:a14="http://schemas.microsoft.com/office/drawing/2010/main" xmlns="" w="9525">
+                <a:ext uri="{91240B29-F687-4F45-9708-019B960494DF}">
+                  <a14:hiddenLine xmlns:a14="http://schemas.microsoft.com/office/drawing/2010/main" w="9525">
                     <a:solidFill>
                       <a:srgbClr val="000000"/>
                     </a:solidFill>
@@ -11002,8 +11003,8 @@
                 <a:noFill/>
               </a:ln>
               <a:extLst>
-                <a:ext uri="{91240B29-F687-4f45-9708-019B960494DF}">
-                  <a14:hiddenLine xmlns:a14="http://schemas.microsoft.com/office/drawing/2010/main" xmlns="" w="9525">
+                <a:ext uri="{91240B29-F687-4F45-9708-019B960494DF}">
+                  <a14:hiddenLine xmlns:a14="http://schemas.microsoft.com/office/drawing/2010/main" w="9525">
                     <a:solidFill>
                       <a:srgbClr val="000000"/>
                     </a:solidFill>
@@ -11100,8 +11101,8 @@
                 <a:noFill/>
               </a:ln>
               <a:extLst>
-                <a:ext uri="{91240B29-F687-4f45-9708-019B960494DF}">
-                  <a14:hiddenLine xmlns:a14="http://schemas.microsoft.com/office/drawing/2010/main" xmlns="" w="9525">
+                <a:ext uri="{91240B29-F687-4F45-9708-019B960494DF}">
+                  <a14:hiddenLine xmlns:a14="http://schemas.microsoft.com/office/drawing/2010/main" w="9525">
                     <a:solidFill>
                       <a:srgbClr val="000000"/>
                     </a:solidFill>
@@ -11215,8 +11216,8 @@
                 <a:noFill/>
               </a:ln>
               <a:extLst>
-                <a:ext uri="{91240B29-F687-4f45-9708-019B960494DF}">
-                  <a14:hiddenLine xmlns:a14="http://schemas.microsoft.com/office/drawing/2010/main" xmlns="" w="9525">
+                <a:ext uri="{91240B29-F687-4F45-9708-019B960494DF}">
+                  <a14:hiddenLine xmlns:a14="http://schemas.microsoft.com/office/drawing/2010/main" w="9525">
                     <a:solidFill>
                       <a:srgbClr val="000000"/>
                     </a:solidFill>
@@ -11305,8 +11306,8 @@
                 <a:noFill/>
               </a:ln>
               <a:extLst>
-                <a:ext uri="{91240B29-F687-4f45-9708-019B960494DF}">
-                  <a14:hiddenLine xmlns:a14="http://schemas.microsoft.com/office/drawing/2010/main" xmlns="" w="9525">
+                <a:ext uri="{91240B29-F687-4F45-9708-019B960494DF}">
+                  <a14:hiddenLine xmlns:a14="http://schemas.microsoft.com/office/drawing/2010/main" w="9525">
                     <a:solidFill>
                       <a:srgbClr val="000000"/>
                     </a:solidFill>
@@ -11370,8 +11371,8 @@
                 <a:noFill/>
               </a:ln>
               <a:extLst>
-                <a:ext uri="{91240B29-F687-4f45-9708-019B960494DF}">
-                  <a14:hiddenLine xmlns:a14="http://schemas.microsoft.com/office/drawing/2010/main" xmlns="" w="9525">
+                <a:ext uri="{91240B29-F687-4F45-9708-019B960494DF}">
+                  <a14:hiddenLine xmlns:a14="http://schemas.microsoft.com/office/drawing/2010/main" w="9525">
                     <a:solidFill>
                       <a:srgbClr val="000000"/>
                     </a:solidFill>
@@ -11460,8 +11461,8 @@
                 <a:noFill/>
               </a:ln>
               <a:extLst>
-                <a:ext uri="{91240B29-F687-4f45-9708-019B960494DF}">
-                  <a14:hiddenLine xmlns:a14="http://schemas.microsoft.com/office/drawing/2010/main" xmlns="" w="9525">
+                <a:ext uri="{91240B29-F687-4F45-9708-019B960494DF}">
+                  <a14:hiddenLine xmlns:a14="http://schemas.microsoft.com/office/drawing/2010/main" w="9525">
                     <a:solidFill>
                       <a:srgbClr val="000000"/>
                     </a:solidFill>
@@ -11528,8 +11529,8 @@
                 <a:noFill/>
               </a:ln>
               <a:extLst>
-                <a:ext uri="{91240B29-F687-4f45-9708-019B960494DF}">
-                  <a14:hiddenLine xmlns:a14="http://schemas.microsoft.com/office/drawing/2010/main" xmlns="" w="9525">
+                <a:ext uri="{91240B29-F687-4F45-9708-019B960494DF}">
+                  <a14:hiddenLine xmlns:a14="http://schemas.microsoft.com/office/drawing/2010/main" w="9525">
                     <a:solidFill>
                       <a:srgbClr val="000000"/>
                     </a:solidFill>
@@ -11618,8 +11619,8 @@
                 <a:noFill/>
               </a:ln>
               <a:extLst>
-                <a:ext uri="{91240B29-F687-4f45-9708-019B960494DF}">
-                  <a14:hiddenLine xmlns:a14="http://schemas.microsoft.com/office/drawing/2010/main" xmlns="" w="9525">
+                <a:ext uri="{91240B29-F687-4F45-9708-019B960494DF}">
+                  <a14:hiddenLine xmlns:a14="http://schemas.microsoft.com/office/drawing/2010/main" w="9525">
                     <a:solidFill>
                       <a:srgbClr val="000000"/>
                     </a:solidFill>
@@ -11686,8 +11687,8 @@
                 <a:noFill/>
               </a:ln>
               <a:extLst>
-                <a:ext uri="{91240B29-F687-4f45-9708-019B960494DF}">
-                  <a14:hiddenLine xmlns:a14="http://schemas.microsoft.com/office/drawing/2010/main" xmlns="" w="9525">
+                <a:ext uri="{91240B29-F687-4F45-9708-019B960494DF}">
+                  <a14:hiddenLine xmlns:a14="http://schemas.microsoft.com/office/drawing/2010/main" w="9525">
                     <a:solidFill>
                       <a:srgbClr val="000000"/>
                     </a:solidFill>
@@ -11776,8 +11777,8 @@
                 <a:noFill/>
               </a:ln>
               <a:extLst>
-                <a:ext uri="{91240B29-F687-4f45-9708-019B960494DF}">
-                  <a14:hiddenLine xmlns:a14="http://schemas.microsoft.com/office/drawing/2010/main" xmlns="" w="9525">
+                <a:ext uri="{91240B29-F687-4F45-9708-019B960494DF}">
+                  <a14:hiddenLine xmlns:a14="http://schemas.microsoft.com/office/drawing/2010/main" w="9525">
                     <a:solidFill>
                       <a:srgbClr val="000000"/>
                     </a:solidFill>
@@ -11810,8 +11811,8 @@
                 <a:noFill/>
               </a:ln>
               <a:extLst>
-                <a:ext uri="{91240B29-F687-4f45-9708-019B960494DF}">
-                  <a14:hiddenLine xmlns:a14="http://schemas.microsoft.com/office/drawing/2010/main" xmlns="" w="9525">
+                <a:ext uri="{91240B29-F687-4F45-9708-019B960494DF}">
+                  <a14:hiddenLine xmlns:a14="http://schemas.microsoft.com/office/drawing/2010/main" w="9525">
                     <a:solidFill>
                       <a:srgbClr val="000000"/>
                     </a:solidFill>
@@ -11952,7 +11953,7 @@
             <a:fld id="{48A87A34-81AB-432B-8DAE-1953F412C126}" type="datetimeFigureOut">
               <a:rPr lang="en-US" dirty="0"/>
               <a:pPr/>
-              <a:t>6/9/19</a:t>
+              <a:t>6/10/2019</a:t>
             </a:fld>
             <a:endParaRPr lang="en-US" dirty="0"/>
           </a:p>
@@ -12373,7 +12374,7 @@
           <p:cNvPr id="2" name="Title 1">
             <a:extLst>
               <a:ext uri="{FF2B5EF4-FFF2-40B4-BE49-F238E27FC236}">
-                <a16:creationId xmlns:a16="http://schemas.microsoft.com/office/drawing/2014/main" id="{C654EB24-065B-8E41-8BE8-62FD5130A339}"/>
+                <a16:creationId xmlns:a16="http://schemas.microsoft.com/office/drawing/2014/main" xmlns="" id="{C654EB24-065B-8E41-8BE8-62FD5130A339}"/>
               </a:ext>
             </a:extLst>
           </p:cNvPr>
@@ -12401,7 +12402,7 @@
           <p:cNvPr id="3" name="Subtitle 2">
             <a:extLst>
               <a:ext uri="{FF2B5EF4-FFF2-40B4-BE49-F238E27FC236}">
-                <a16:creationId xmlns:a16="http://schemas.microsoft.com/office/drawing/2014/main" id="{E3BC71AF-9F8A-8446-A164-40261A52DECA}"/>
+                <a16:creationId xmlns:a16="http://schemas.microsoft.com/office/drawing/2014/main" xmlns="" id="{E3BC71AF-9F8A-8446-A164-40261A52DECA}"/>
               </a:ext>
             </a:extLst>
           </p:cNvPr>
@@ -12459,7 +12460,7 @@
           <p:cNvPr id="2" name="Title 1">
             <a:extLst>
               <a:ext uri="{FF2B5EF4-FFF2-40B4-BE49-F238E27FC236}">
-                <a16:creationId xmlns:a16="http://schemas.microsoft.com/office/drawing/2014/main" id="{8A91D19E-FE4B-BE41-AC17-F96D01AFD293}"/>
+                <a16:creationId xmlns:a16="http://schemas.microsoft.com/office/drawing/2014/main" xmlns="" id="{BB947B40-8DC6-934D-AFF2-5E10C660E3F1}"/>
               </a:ext>
             </a:extLst>
           </p:cNvPr>
@@ -12476,9 +12477,10 @@
           <a:lstStyle/>
           <a:p>
             <a:r>
-              <a:rPr lang="en-US" dirty="0"/>
-              <a:t>Create a profile</a:t>
-            </a:r>
+              <a:rPr lang="en-US" dirty="0" smtClean="0"/>
+              <a:t>Implementation</a:t>
+            </a:r>
+            <a:endParaRPr lang="en-US" dirty="0"/>
           </a:p>
         </p:txBody>
       </p:sp>
@@ -12487,7 +12489,7 @@
           <p:cNvPr id="3" name="Content Placeholder 2">
             <a:extLst>
               <a:ext uri="{FF2B5EF4-FFF2-40B4-BE49-F238E27FC236}">
-                <a16:creationId xmlns:a16="http://schemas.microsoft.com/office/drawing/2014/main" id="{BDF6C152-7F32-3E46-A62D-0DA0C36D059B}"/>
+                <a16:creationId xmlns:a16="http://schemas.microsoft.com/office/drawing/2014/main" xmlns="" id="{48DD9BC4-13DA-7F43-AA91-4E86914A409C}"/>
               </a:ext>
             </a:extLst>
           </p:cNvPr>
@@ -12505,113 +12507,32 @@
           <a:p>
             <a:r>
               <a:rPr lang="en-US" dirty="0"/>
-              <a:t>ALPS Profile</a:t>
-            </a:r>
+              <a:t>Write the </a:t>
+            </a:r>
+            <a:r>
+              <a:rPr lang="en-US" dirty="0" smtClean="0"/>
+              <a:t>code for the API</a:t>
+            </a:r>
+          </a:p>
+          <a:p>
+            <a:endParaRPr lang="en-US" dirty="0"/>
           </a:p>
           <a:p>
             <a:r>
               <a:rPr lang="en-US" dirty="0"/>
-              <a:t>&lt;link </a:t>
-            </a:r>
-            <a:r>
-              <a:rPr lang="en-US" dirty="0" err="1"/>
-              <a:t>rel</a:t>
-            </a:r>
-            <a:r>
-              <a:rPr lang="en-US" dirty="0"/>
-              <a:t>=“profile” </a:t>
-            </a:r>
-            <a:r>
-              <a:rPr lang="en-US" dirty="0" err="1"/>
-              <a:t>href</a:t>
-            </a:r>
-            <a:r>
-              <a:rPr lang="en-US" dirty="0"/>
-              <a:t>=</a:t>
-            </a:r>
-            <a:r>
-              <a:rPr lang="en-US" dirty="0">
-                <a:hlinkClick r:id="rId2"/>
-              </a:rPr>
-              <a:t>http://schema.org/Person</a:t>
-            </a:r>
-            <a:r>
-              <a:rPr lang="en-US" dirty="0"/>
-              <a:t>&gt;</a:t>
-            </a:r>
-          </a:p>
-          <a:p>
-            <a:r>
-              <a:rPr lang="en-US" dirty="0"/>
-              <a:t>&lt;link </a:t>
-            </a:r>
-            <a:r>
-              <a:rPr lang="en-US" dirty="0" err="1"/>
-              <a:t>rel</a:t>
-            </a:r>
-            <a:r>
-              <a:rPr lang="en-US" dirty="0"/>
-              <a:t>=“profile” </a:t>
-            </a:r>
-            <a:r>
-              <a:rPr lang="en-US" dirty="0" err="1"/>
-              <a:t>href</a:t>
-            </a:r>
-            <a:r>
-              <a:rPr lang="en-US" dirty="0"/>
-              <a:t>=</a:t>
-            </a:r>
-            <a:r>
-              <a:rPr lang="en-US" dirty="0">
-                <a:hlinkClick r:id="rId3"/>
-              </a:rPr>
-              <a:t>http://schema.org/</a:t>
-            </a:r>
-            <a:r>
-              <a:rPr lang="en-US" dirty="0" err="1"/>
-              <a:t>PostalAddress</a:t>
-            </a:r>
-            <a:r>
-              <a:rPr lang="en-US" dirty="0"/>
-              <a:t>”&gt;</a:t>
-            </a:r>
-          </a:p>
-          <a:p>
-            <a:r>
-              <a:rPr lang="en-US" dirty="0"/>
-              <a:t>&lt;link </a:t>
-            </a:r>
-            <a:r>
-              <a:rPr lang="en-US" dirty="0" err="1"/>
-              <a:t>rel</a:t>
-            </a:r>
-            <a:r>
-              <a:rPr lang="en-US" dirty="0"/>
-              <a:t>=“profile” </a:t>
-            </a:r>
-            <a:r>
-              <a:rPr lang="en-US" dirty="0" err="1"/>
-              <a:t>href</a:t>
-            </a:r>
-            <a:r>
-              <a:rPr lang="en-US" dirty="0"/>
-              <a:t>=</a:t>
-            </a:r>
-            <a:r>
-              <a:rPr lang="en-US" dirty="0">
-                <a:hlinkClick r:id="rId2"/>
-              </a:rPr>
-              <a:t>http://schema.org/P</a:t>
-            </a:r>
-            <a:r>
-              <a:rPr lang="en-US" dirty="0"/>
-              <a:t>roperty”&gt;</a:t>
-            </a:r>
-          </a:p>
-          <a:p>
-            <a:endParaRPr lang="en-US" dirty="0"/>
-          </a:p>
-          <a:p>
+              <a:t>Implement the </a:t>
+            </a:r>
+            <a:r>
+              <a:rPr lang="en-US" dirty="0" smtClean="0"/>
+              <a:t>code</a:t>
+            </a:r>
+          </a:p>
+          <a:p>
+            <a:pPr lvl="1"/>
+            <a:r>
+              <a:rPr lang="en-US" dirty="0" smtClean="0"/>
+              <a:t>Create the app that will use the API for the Scouts to interact with</a:t>
+            </a:r>
             <a:endParaRPr lang="en-US" dirty="0"/>
           </a:p>
         </p:txBody>
@@ -12619,7 +12540,101 @@
     </p:spTree>
     <p:extLst>
       <p:ext uri="{BB962C8B-B14F-4D97-AF65-F5344CB8AC3E}">
-        <p14:creationId xmlns:p14="http://schemas.microsoft.com/office/powerpoint/2010/main" val="2748786425"/>
+        <p14:creationId xmlns:p14="http://schemas.microsoft.com/office/powerpoint/2010/main" val="568605657"/>
+      </p:ext>
+    </p:extLst>
+  </p:cSld>
+  <p:clrMapOvr>
+    <a:masterClrMapping/>
+  </p:clrMapOvr>
+</p:sld>
+</file>
+
+<file path=ppt/slides/slide11.xml><?xml version="1.0" encoding="utf-8"?>
+<p:sld xmlns:a="http://schemas.openxmlformats.org/drawingml/2006/main" xmlns:r="http://schemas.openxmlformats.org/officeDocument/2006/relationships" xmlns:p="http://schemas.openxmlformats.org/presentationml/2006/main">
+  <p:cSld>
+    <p:spTree>
+      <p:nvGrpSpPr>
+        <p:cNvPr id="1" name=""/>
+        <p:cNvGrpSpPr/>
+        <p:nvPr/>
+      </p:nvGrpSpPr>
+      <p:grpSpPr>
+        <a:xfrm>
+          <a:off x="0" y="0"/>
+          <a:ext cx="0" cy="0"/>
+          <a:chOff x="0" y="0"/>
+          <a:chExt cx="0" cy="0"/>
+        </a:xfrm>
+      </p:grpSpPr>
+      <p:sp>
+        <p:nvSpPr>
+          <p:cNvPr id="2" name="Title 1"/>
+          <p:cNvSpPr>
+            <a:spLocks noGrp="1"/>
+          </p:cNvSpPr>
+          <p:nvPr>
+            <p:ph type="title"/>
+          </p:nvPr>
+        </p:nvSpPr>
+        <p:spPr/>
+        <p:txBody>
+          <a:bodyPr/>
+          <a:lstStyle/>
+          <a:p>
+            <a:r>
+              <a:rPr lang="en-US" dirty="0" smtClean="0"/>
+              <a:t>publication</a:t>
+            </a:r>
+            <a:endParaRPr lang="en-US" dirty="0"/>
+          </a:p>
+        </p:txBody>
+      </p:sp>
+      <p:sp>
+        <p:nvSpPr>
+          <p:cNvPr id="3" name="Content Placeholder 2"/>
+          <p:cNvSpPr>
+            <a:spLocks noGrp="1"/>
+          </p:cNvSpPr>
+          <p:nvPr>
+            <p:ph idx="1"/>
+          </p:nvPr>
+        </p:nvSpPr>
+        <p:spPr/>
+        <p:txBody>
+          <a:bodyPr/>
+          <a:lstStyle/>
+          <a:p>
+            <a:r>
+              <a:rPr lang="en-US" dirty="0" smtClean="0"/>
+              <a:t>Put app on App Store and Google Play</a:t>
+            </a:r>
+          </a:p>
+          <a:p>
+            <a:r>
+              <a:rPr lang="en-US" dirty="0" smtClean="0"/>
+              <a:t>Publish URL – may not be necessary as API is intended only for this app</a:t>
+            </a:r>
+          </a:p>
+          <a:p>
+            <a:r>
+              <a:rPr lang="en-US" dirty="0" smtClean="0"/>
+              <a:t>Publish profile – submit to alps.io</a:t>
+            </a:r>
+          </a:p>
+          <a:p>
+            <a:r>
+              <a:rPr lang="en-US" dirty="0" smtClean="0"/>
+              <a:t>Register new media types and link relations – no new ones used in this API</a:t>
+            </a:r>
+            <a:endParaRPr lang="en-US" dirty="0"/>
+          </a:p>
+        </p:txBody>
+      </p:sp>
+    </p:spTree>
+    <p:extLst>
+      <p:ext uri="{BB962C8B-B14F-4D97-AF65-F5344CB8AC3E}">
+        <p14:creationId xmlns:p14="http://schemas.microsoft.com/office/powerpoint/2010/main" val="2709826386"/>
       </p:ext>
     </p:extLst>
   </p:cSld>
@@ -12651,7 +12666,7 @@
           <p:cNvPr id="2" name="Title 1">
             <a:extLst>
               <a:ext uri="{FF2B5EF4-FFF2-40B4-BE49-F238E27FC236}">
-                <a16:creationId xmlns:a16="http://schemas.microsoft.com/office/drawing/2014/main" id="{6EA08E2B-A4F8-204A-943A-A865070C112A}"/>
+                <a16:creationId xmlns:a16="http://schemas.microsoft.com/office/drawing/2014/main" xmlns="" id="{6EA08E2B-A4F8-204A-943A-A865070C112A}"/>
               </a:ext>
             </a:extLst>
           </p:cNvPr>
@@ -12684,7 +12699,7 @@
           <p:cNvPr id="3" name="Content Placeholder 2">
             <a:extLst>
               <a:ext uri="{FF2B5EF4-FFF2-40B4-BE49-F238E27FC236}">
-                <a16:creationId xmlns:a16="http://schemas.microsoft.com/office/drawing/2014/main" id="{DDC54293-561A-154A-B979-133348982087}"/>
+                <a16:creationId xmlns:a16="http://schemas.microsoft.com/office/drawing/2014/main" xmlns="" id="{DDC54293-561A-154A-B979-133348982087}"/>
               </a:ext>
             </a:extLst>
           </p:cNvPr>
@@ -12742,7 +12757,7 @@
           <p:cNvPr id="2" name="Title 1">
             <a:extLst>
               <a:ext uri="{FF2B5EF4-FFF2-40B4-BE49-F238E27FC236}">
-                <a16:creationId xmlns:a16="http://schemas.microsoft.com/office/drawing/2014/main" id="{23C392B1-A420-9945-89BF-228AB34BC892}"/>
+                <a16:creationId xmlns:a16="http://schemas.microsoft.com/office/drawing/2014/main" xmlns="" id="{23C392B1-A420-9945-89BF-228AB34BC892}"/>
               </a:ext>
             </a:extLst>
           </p:cNvPr>
@@ -12770,7 +12785,7 @@
           <p:cNvPr id="3" name="Content Placeholder 2">
             <a:extLst>
               <a:ext uri="{FF2B5EF4-FFF2-40B4-BE49-F238E27FC236}">
-                <a16:creationId xmlns:a16="http://schemas.microsoft.com/office/drawing/2014/main" id="{CEA7EE19-F4E3-B742-9E35-5BD54A45E5A2}"/>
+                <a16:creationId xmlns:a16="http://schemas.microsoft.com/office/drawing/2014/main" xmlns="" id="{CEA7EE19-F4E3-B742-9E35-5BD54A45E5A2}"/>
               </a:ext>
             </a:extLst>
           </p:cNvPr>
@@ -12828,7 +12843,7 @@
           <p:cNvPr id="2" name="Title 1">
             <a:extLst>
               <a:ext uri="{FF2B5EF4-FFF2-40B4-BE49-F238E27FC236}">
-                <a16:creationId xmlns:a16="http://schemas.microsoft.com/office/drawing/2014/main" id="{BB947B40-8DC6-934D-AFF2-5E10C660E3F1}"/>
+                <a16:creationId xmlns:a16="http://schemas.microsoft.com/office/drawing/2014/main" xmlns="" id="{2FE069D7-B970-6046-A379-3EBF50D2EB66}"/>
               </a:ext>
             </a:extLst>
           </p:cNvPr>
@@ -12846,7 +12861,7 @@
           <a:p>
             <a:r>
               <a:rPr lang="en-US" dirty="0"/>
-              <a:t>Final steps</a:t>
+              <a:t>Seven-step design process</a:t>
             </a:r>
           </a:p>
         </p:txBody>
@@ -12856,7 +12871,7 @@
           <p:cNvPr id="3" name="Content Placeholder 2">
             <a:extLst>
               <a:ext uri="{FF2B5EF4-FFF2-40B4-BE49-F238E27FC236}">
-                <a16:creationId xmlns:a16="http://schemas.microsoft.com/office/drawing/2014/main" id="{48DD9BC4-13DA-7F43-AA91-4E86914A409C}"/>
+                <a16:creationId xmlns:a16="http://schemas.microsoft.com/office/drawing/2014/main" xmlns="" id="{839D76D7-B78F-C24E-915D-42B0B665A500}"/>
               </a:ext>
             </a:extLst>
           </p:cNvPr>
@@ -12869,18 +12884,50 @@
         </p:nvSpPr>
         <p:spPr/>
         <p:txBody>
-          <a:bodyPr/>
+          <a:bodyPr>
+            <a:normAutofit fontScale="92500" lnSpcReduction="10000"/>
+          </a:bodyPr>
           <a:lstStyle/>
           <a:p>
             <a:r>
               <a:rPr lang="en-US" dirty="0"/>
-              <a:t>Write the code</a:t>
+              <a:t>1.	List all semantic descriptors</a:t>
             </a:r>
           </a:p>
           <a:p>
             <a:r>
               <a:rPr lang="en-US" dirty="0"/>
-              <a:t>Implement the code</a:t>
+              <a:t>2.	Draw a state diagram</a:t>
+            </a:r>
+          </a:p>
+          <a:p>
+            <a:r>
+              <a:rPr lang="en-US" dirty="0"/>
+              <a:t>3.	Reconcile semantic descriptors with existing profiles</a:t>
+            </a:r>
+          </a:p>
+          <a:p>
+            <a:r>
+              <a:rPr lang="en-US" dirty="0"/>
+              <a:t>4.	Choose a media type</a:t>
+            </a:r>
+          </a:p>
+          <a:p>
+            <a:r>
+              <a:rPr lang="en-US" dirty="0"/>
+              <a:t>5.	Write a profile</a:t>
+            </a:r>
+          </a:p>
+          <a:p>
+            <a:r>
+              <a:rPr lang="en-US" dirty="0"/>
+              <a:t>6.	Write the code for the API</a:t>
+            </a:r>
+          </a:p>
+          <a:p>
+            <a:r>
+              <a:rPr lang="en-US" dirty="0"/>
+              <a:t>7.	Publish the API</a:t>
             </a:r>
           </a:p>
         </p:txBody>
@@ -12888,7 +12935,7 @@
     </p:spTree>
     <p:extLst>
       <p:ext uri="{BB962C8B-B14F-4D97-AF65-F5344CB8AC3E}">
-        <p14:creationId xmlns:p14="http://schemas.microsoft.com/office/powerpoint/2010/main" val="568605657"/>
+        <p14:creationId xmlns:p14="http://schemas.microsoft.com/office/powerpoint/2010/main" val="2317417461"/>
       </p:ext>
     </p:extLst>
   </p:cSld>
@@ -12920,7 +12967,7 @@
           <p:cNvPr id="2" name="Title 1">
             <a:extLst>
               <a:ext uri="{FF2B5EF4-FFF2-40B4-BE49-F238E27FC236}">
-                <a16:creationId xmlns:a16="http://schemas.microsoft.com/office/drawing/2014/main" id="{2FE069D7-B970-6046-A379-3EBF50D2EB66}"/>
+                <a16:creationId xmlns:a16="http://schemas.microsoft.com/office/drawing/2014/main" xmlns="" id="{AB074070-97F1-F24E-A446-AB85E307F7A8}"/>
               </a:ext>
             </a:extLst>
           </p:cNvPr>
@@ -12938,7 +12985,7 @@
           <a:p>
             <a:r>
               <a:rPr lang="en-US" dirty="0"/>
-              <a:t>Seven-step design process</a:t>
+              <a:t>Semantic descriptors</a:t>
             </a:r>
           </a:p>
         </p:txBody>
@@ -12948,7 +12995,7 @@
           <p:cNvPr id="3" name="Content Placeholder 2">
             <a:extLst>
               <a:ext uri="{FF2B5EF4-FFF2-40B4-BE49-F238E27FC236}">
-                <a16:creationId xmlns:a16="http://schemas.microsoft.com/office/drawing/2014/main" id="{839D76D7-B78F-C24E-915D-42B0B665A500}"/>
+                <a16:creationId xmlns:a16="http://schemas.microsoft.com/office/drawing/2014/main" xmlns="" id="{0E11D1D9-867F-6F4F-AB43-70C1EBDEC330}"/>
               </a:ext>
             </a:extLst>
           </p:cNvPr>
@@ -12962,49 +13009,94 @@
         <p:spPr/>
         <p:txBody>
           <a:bodyPr>
-            <a:normAutofit fontScale="92500" lnSpcReduction="10000"/>
+            <a:normAutofit fontScale="70000" lnSpcReduction="20000"/>
           </a:bodyPr>
           <a:lstStyle/>
           <a:p>
             <a:r>
               <a:rPr lang="en-US" dirty="0"/>
-              <a:t>1.	List all semantic descriptors</a:t>
-            </a:r>
-          </a:p>
-          <a:p>
+              <a:t>Customer</a:t>
+            </a:r>
+          </a:p>
+          <a:p>
+            <a:pPr lvl="1"/>
             <a:r>
               <a:rPr lang="en-US" dirty="0"/>
-              <a:t>2.	Draw a state diagram</a:t>
-            </a:r>
-          </a:p>
-          <a:p>
+              <a:t>First Name</a:t>
+            </a:r>
+          </a:p>
+          <a:p>
+            <a:pPr lvl="1"/>
             <a:r>
               <a:rPr lang="en-US" dirty="0"/>
-              <a:t>3.	Reconcile semantic descriptors with existing profiles</a:t>
-            </a:r>
-          </a:p>
-          <a:p>
+              <a:t>Last Name</a:t>
+            </a:r>
+          </a:p>
+          <a:p>
+            <a:pPr lvl="1"/>
             <a:r>
               <a:rPr lang="en-US" dirty="0"/>
-              <a:t>4.	Choose a media type</a:t>
-            </a:r>
-          </a:p>
-          <a:p>
+              <a:t>Street address</a:t>
+            </a:r>
+          </a:p>
+          <a:p>
+            <a:pPr lvl="1"/>
             <a:r>
               <a:rPr lang="en-US" dirty="0"/>
-              <a:t>5.	Write a profile</a:t>
-            </a:r>
-          </a:p>
-          <a:p>
+              <a:t>City</a:t>
+            </a:r>
+          </a:p>
+          <a:p>
+            <a:pPr lvl="1"/>
             <a:r>
               <a:rPr lang="en-US" dirty="0"/>
-              <a:t>6.	Write the code for the API</a:t>
-            </a:r>
+              <a:t>State</a:t>
+            </a:r>
+          </a:p>
+          <a:p>
+            <a:pPr lvl="1"/>
+            <a:r>
+              <a:rPr lang="en-US" dirty="0" smtClean="0"/>
+              <a:t>Zip</a:t>
+            </a:r>
+            <a:endParaRPr lang="en-US" dirty="0"/>
           </a:p>
           <a:p>
             <a:r>
               <a:rPr lang="en-US" dirty="0"/>
-              <a:t>7.	Publish the API</a:t>
+              <a:t>Purchase</a:t>
+            </a:r>
+          </a:p>
+          <a:p>
+            <a:pPr lvl="1"/>
+            <a:r>
+              <a:rPr lang="en-US" dirty="0"/>
+              <a:t>Item</a:t>
+            </a:r>
+          </a:p>
+          <a:p>
+            <a:pPr lvl="1"/>
+            <a:r>
+              <a:rPr lang="en-US" dirty="0" smtClean="0"/>
+              <a:t>Quantity</a:t>
+            </a:r>
+          </a:p>
+          <a:p>
+            <a:pPr lvl="1"/>
+            <a:r>
+              <a:rPr lang="en-US" dirty="0" smtClean="0"/>
+              <a:t>Price</a:t>
+            </a:r>
+          </a:p>
+          <a:p>
+            <a:pPr lvl="1"/>
+            <a:r>
+              <a:rPr lang="en-US" dirty="0" smtClean="0"/>
+              <a:t>Total </a:t>
+            </a:r>
+            <a:r>
+              <a:rPr lang="en-US" dirty="0"/>
+              <a:t>Sale</a:t>
             </a:r>
           </a:p>
         </p:txBody>
@@ -13012,7 +13104,7 @@
     </p:spTree>
     <p:extLst>
       <p:ext uri="{BB962C8B-B14F-4D97-AF65-F5344CB8AC3E}">
-        <p14:creationId xmlns:p14="http://schemas.microsoft.com/office/powerpoint/2010/main" val="2317417461"/>
+        <p14:creationId xmlns:p14="http://schemas.microsoft.com/office/powerpoint/2010/main" val="2057329075"/>
       </p:ext>
     </p:extLst>
   </p:cSld>
@@ -13044,7 +13136,7 @@
           <p:cNvPr id="2" name="Title 1">
             <a:extLst>
               <a:ext uri="{FF2B5EF4-FFF2-40B4-BE49-F238E27FC236}">
-                <a16:creationId xmlns:a16="http://schemas.microsoft.com/office/drawing/2014/main" id="{AB074070-97F1-F24E-A446-AB85E307F7A8}"/>
+                <a16:creationId xmlns:a16="http://schemas.microsoft.com/office/drawing/2014/main" xmlns="" id="{AEA92EAC-0490-854E-9C9D-EE340FD869B3}"/>
               </a:ext>
             </a:extLst>
           </p:cNvPr>
@@ -13062,115 +13154,44 @@
           <a:p>
             <a:r>
               <a:rPr lang="en-US" dirty="0"/>
-              <a:t>Semantic descriptors</a:t>
+              <a:t>State diagram</a:t>
             </a:r>
           </a:p>
         </p:txBody>
       </p:sp>
-      <p:sp>
-        <p:nvSpPr>
-          <p:cNvPr id="3" name="Content Placeholder 2">
-            <a:extLst>
-              <a:ext uri="{FF2B5EF4-FFF2-40B4-BE49-F238E27FC236}">
-                <a16:creationId xmlns:a16="http://schemas.microsoft.com/office/drawing/2014/main" id="{0E11D1D9-867F-6F4F-AB43-70C1EBDEC330}"/>
-              </a:ext>
-            </a:extLst>
-          </p:cNvPr>
-          <p:cNvSpPr>
-            <a:spLocks noGrp="1"/>
-          </p:cNvSpPr>
+      <p:pic>
+        <p:nvPicPr>
+          <p:cNvPr id="4" name="Content Placeholder 3"/>
+          <p:cNvPicPr>
+            <a:picLocks noGrp="1" noChangeAspect="1"/>
+          </p:cNvPicPr>
           <p:nvPr>
             <p:ph idx="1"/>
           </p:nvPr>
-        </p:nvSpPr>
-        <p:spPr/>
-        <p:txBody>
-          <a:bodyPr>
-            <a:normAutofit fontScale="70000" lnSpcReduction="20000"/>
-          </a:bodyPr>
-          <a:lstStyle/>
-          <a:p>
-            <a:r>
-              <a:rPr lang="en-US" dirty="0"/>
-              <a:t>Customer</a:t>
-            </a:r>
-          </a:p>
-          <a:p>
-            <a:pPr lvl="1"/>
-            <a:r>
-              <a:rPr lang="en-US" dirty="0"/>
-              <a:t>First Name</a:t>
-            </a:r>
-          </a:p>
-          <a:p>
-            <a:pPr lvl="1"/>
-            <a:r>
-              <a:rPr lang="en-US" dirty="0"/>
-              <a:t>Last Name</a:t>
-            </a:r>
-          </a:p>
-          <a:p>
-            <a:pPr lvl="1"/>
-            <a:r>
-              <a:rPr lang="en-US" dirty="0"/>
-              <a:t>Street address</a:t>
-            </a:r>
-          </a:p>
-          <a:p>
-            <a:pPr lvl="1"/>
-            <a:r>
-              <a:rPr lang="en-US" dirty="0"/>
-              <a:t>City</a:t>
-            </a:r>
-          </a:p>
-          <a:p>
-            <a:pPr lvl="1"/>
-            <a:r>
-              <a:rPr lang="en-US" dirty="0"/>
-              <a:t>State</a:t>
-            </a:r>
-          </a:p>
-          <a:p>
-            <a:pPr lvl="1"/>
-            <a:r>
-              <a:rPr lang="en-US" dirty="0" err="1"/>
-              <a:t>ZipI</a:t>
-            </a:r>
-            <a:endParaRPr lang="en-US" dirty="0"/>
-          </a:p>
-          <a:p>
-            <a:r>
-              <a:rPr lang="en-US" dirty="0"/>
-              <a:t>Purchase</a:t>
-            </a:r>
-          </a:p>
-          <a:p>
-            <a:pPr lvl="1"/>
-            <a:r>
-              <a:rPr lang="en-US" dirty="0"/>
-              <a:t>Item</a:t>
-            </a:r>
-          </a:p>
-          <a:p>
-            <a:pPr lvl="1"/>
-            <a:r>
-              <a:rPr lang="en-US" dirty="0"/>
-              <a:t>Quantity</a:t>
-            </a:r>
-          </a:p>
-          <a:p>
-            <a:pPr lvl="1"/>
-            <a:r>
-              <a:rPr lang="en-US" dirty="0"/>
-              <a:t>Total Sale</a:t>
-            </a:r>
-          </a:p>
-        </p:txBody>
-      </p:sp>
+        </p:nvPicPr>
+        <p:blipFill>
+          <a:blip r:embed="rId2">
+            <a:extLst>
+              <a:ext uri="{28A0092B-C50C-407E-A947-70E740481C1C}">
+                <a14:useLocalDpi xmlns:a14="http://schemas.microsoft.com/office/drawing/2010/main" val="0"/>
+              </a:ext>
+            </a:extLst>
+          </a:blip>
+          <a:stretch>
+            <a:fillRect/>
+          </a:stretch>
+        </p:blipFill>
+        <p:spPr>
+          <a:xfrm>
+            <a:off x="2661120" y="2249488"/>
+            <a:ext cx="6866585" cy="3541712"/>
+          </a:xfrm>
+        </p:spPr>
+      </p:pic>
     </p:spTree>
     <p:extLst>
       <p:ext uri="{BB962C8B-B14F-4D97-AF65-F5344CB8AC3E}">
-        <p14:creationId xmlns:p14="http://schemas.microsoft.com/office/powerpoint/2010/main" val="2057329075"/>
+        <p14:creationId xmlns:p14="http://schemas.microsoft.com/office/powerpoint/2010/main" val="2046178017"/>
       </p:ext>
     </p:extLst>
   </p:cSld>
@@ -13202,7 +13223,7 @@
           <p:cNvPr id="2" name="Title 1">
             <a:extLst>
               <a:ext uri="{FF2B5EF4-FFF2-40B4-BE49-F238E27FC236}">
-                <a16:creationId xmlns:a16="http://schemas.microsoft.com/office/drawing/2014/main" id="{AEA92EAC-0490-854E-9C9D-EE340FD869B3}"/>
+                <a16:creationId xmlns:a16="http://schemas.microsoft.com/office/drawing/2014/main" xmlns="" id="{AE824C0D-BBA7-C64A-9610-0B0118731CD6}"/>
               </a:ext>
             </a:extLst>
           </p:cNvPr>
@@ -13220,44 +13241,200 @@
           <a:p>
             <a:r>
               <a:rPr lang="en-US" dirty="0"/>
-              <a:t>State diagram</a:t>
+              <a:t>Reconcile names</a:t>
             </a:r>
           </a:p>
         </p:txBody>
       </p:sp>
-      <p:pic>
-        <p:nvPicPr>
-          <p:cNvPr id="5" name="Content Placeholder 4">
+      <p:sp>
+        <p:nvSpPr>
+          <p:cNvPr id="3" name="Content Placeholder 2">
             <a:extLst>
               <a:ext uri="{FF2B5EF4-FFF2-40B4-BE49-F238E27FC236}">
-                <a16:creationId xmlns:a16="http://schemas.microsoft.com/office/drawing/2014/main" id="{87FB26AE-D62C-A347-9393-90E61C5C7362}"/>
+                <a16:creationId xmlns:a16="http://schemas.microsoft.com/office/drawing/2014/main" xmlns="" id="{9D2CA8E7-BE05-8B41-B7E9-772757CB4636}"/>
               </a:ext>
             </a:extLst>
           </p:cNvPr>
-          <p:cNvPicPr>
-            <a:picLocks noGrp="1" noChangeAspect="1"/>
-          </p:cNvPicPr>
+          <p:cNvSpPr>
+            <a:spLocks noGrp="1"/>
+          </p:cNvSpPr>
           <p:nvPr>
             <p:ph idx="1"/>
           </p:nvPr>
-        </p:nvPicPr>
-        <p:blipFill>
-          <a:blip r:embed="rId2"/>
-          <a:stretch>
-            <a:fillRect/>
-          </a:stretch>
-        </p:blipFill>
-        <p:spPr>
-          <a:xfrm>
-            <a:off x="3586163" y="2718594"/>
-            <a:ext cx="5016500" cy="2603500"/>
-          </a:xfrm>
-        </p:spPr>
-      </p:pic>
+        </p:nvSpPr>
+        <p:spPr/>
+        <p:txBody>
+          <a:bodyPr>
+            <a:normAutofit fontScale="85000" lnSpcReduction="20000"/>
+          </a:bodyPr>
+          <a:lstStyle/>
+          <a:p>
+            <a:r>
+              <a:rPr lang="en-US" dirty="0"/>
+              <a:t>First Name =&gt; </a:t>
+            </a:r>
+            <a:r>
+              <a:rPr lang="en-US" dirty="0" err="1"/>
+              <a:t>givenName</a:t>
+            </a:r>
+            <a:r>
+              <a:rPr lang="en-US" dirty="0"/>
+              <a:t> (Person – </a:t>
+            </a:r>
+            <a:r>
+              <a:rPr lang="en-US" dirty="0" err="1"/>
+              <a:t>schema.org</a:t>
+            </a:r>
+            <a:r>
+              <a:rPr lang="en-US" dirty="0"/>
+              <a:t>)</a:t>
+            </a:r>
+          </a:p>
+          <a:p>
+            <a:r>
+              <a:rPr lang="en-US" dirty="0"/>
+              <a:t>Last Name =&gt; </a:t>
+            </a:r>
+            <a:r>
+              <a:rPr lang="en-US" dirty="0" err="1"/>
+              <a:t>familyName</a:t>
+            </a:r>
+            <a:r>
+              <a:rPr lang="en-US" dirty="0"/>
+              <a:t> (Person – </a:t>
+            </a:r>
+            <a:r>
+              <a:rPr lang="en-US" dirty="0" err="1"/>
+              <a:t>schema.org</a:t>
+            </a:r>
+            <a:r>
+              <a:rPr lang="en-US" dirty="0"/>
+              <a:t>)</a:t>
+            </a:r>
+          </a:p>
+          <a:p>
+            <a:r>
+              <a:rPr lang="en-US" dirty="0"/>
+              <a:t>Street Address =&gt; </a:t>
+            </a:r>
+            <a:r>
+              <a:rPr lang="en-US" dirty="0" err="1"/>
+              <a:t>streetAddress</a:t>
+            </a:r>
+            <a:r>
+              <a:rPr lang="en-US" dirty="0"/>
+              <a:t> (</a:t>
+            </a:r>
+            <a:r>
+              <a:rPr lang="en-US" dirty="0" err="1"/>
+              <a:t>PostalAddress</a:t>
+            </a:r>
+            <a:r>
+              <a:rPr lang="en-US" dirty="0"/>
+              <a:t> – </a:t>
+            </a:r>
+            <a:r>
+              <a:rPr lang="en-US" dirty="0" err="1"/>
+              <a:t>schema.org</a:t>
+            </a:r>
+            <a:r>
+              <a:rPr lang="en-US" dirty="0"/>
+              <a:t>)</a:t>
+            </a:r>
+          </a:p>
+          <a:p>
+            <a:r>
+              <a:rPr lang="en-US" dirty="0"/>
+              <a:t>City, State, Zip =&gt; </a:t>
+            </a:r>
+            <a:r>
+              <a:rPr lang="en-US" dirty="0" smtClean="0"/>
+              <a:t>part of </a:t>
+            </a:r>
+            <a:r>
+              <a:rPr lang="en-US" dirty="0" err="1" smtClean="0"/>
+              <a:t>streetAddress</a:t>
+            </a:r>
+            <a:endParaRPr lang="en-US" dirty="0"/>
+          </a:p>
+          <a:p>
+            <a:r>
+              <a:rPr lang="en-US" dirty="0"/>
+              <a:t>Item bought =&gt; item (Property – </a:t>
+            </a:r>
+            <a:r>
+              <a:rPr lang="en-US" dirty="0" err="1"/>
+              <a:t>schema.org</a:t>
+            </a:r>
+            <a:r>
+              <a:rPr lang="en-US" dirty="0"/>
+              <a:t>)</a:t>
+            </a:r>
+          </a:p>
+          <a:p>
+            <a:r>
+              <a:rPr lang="en-US" dirty="0"/>
+              <a:t>Quantity =&gt; </a:t>
+            </a:r>
+            <a:r>
+              <a:rPr lang="en-US" dirty="0" err="1"/>
+              <a:t>orderQuantity</a:t>
+            </a:r>
+            <a:r>
+              <a:rPr lang="en-US" dirty="0"/>
+              <a:t> (Property – </a:t>
+            </a:r>
+            <a:r>
+              <a:rPr lang="en-US" dirty="0" err="1"/>
+              <a:t>schema.org</a:t>
+            </a:r>
+            <a:r>
+              <a:rPr lang="en-US" dirty="0"/>
+              <a:t>)</a:t>
+            </a:r>
+          </a:p>
+          <a:p>
+            <a:r>
+              <a:rPr lang="en-US" dirty="0"/>
+              <a:t>Price =&gt; price (Property – </a:t>
+            </a:r>
+            <a:r>
+              <a:rPr lang="en-US" dirty="0" err="1"/>
+              <a:t>schema.org</a:t>
+            </a:r>
+            <a:r>
+              <a:rPr lang="en-US" dirty="0"/>
+              <a:t>)</a:t>
+            </a:r>
+          </a:p>
+          <a:p>
+            <a:r>
+              <a:rPr lang="en-US" dirty="0"/>
+              <a:t>Total =&gt; </a:t>
+            </a:r>
+            <a:r>
+              <a:rPr lang="en-US" dirty="0" err="1"/>
+              <a:t>totalPrice</a:t>
+            </a:r>
+            <a:r>
+              <a:rPr lang="en-US" dirty="0"/>
+              <a:t> (Property – </a:t>
+            </a:r>
+            <a:r>
+              <a:rPr lang="en-US" dirty="0" err="1"/>
+              <a:t>schema.org</a:t>
+            </a:r>
+            <a:r>
+              <a:rPr lang="en-US" dirty="0"/>
+              <a:t>)</a:t>
+            </a:r>
+          </a:p>
+        </p:txBody>
+      </p:sp>
     </p:spTree>
     <p:extLst>
       <p:ext uri="{BB962C8B-B14F-4D97-AF65-F5344CB8AC3E}">
-        <p14:creationId xmlns:p14="http://schemas.microsoft.com/office/powerpoint/2010/main" val="2046178017"/>
+        <p14:creationId xmlns:p14="http://schemas.microsoft.com/office/powerpoint/2010/main" val="2687109813"/>
       </p:ext>
     </p:extLst>
   </p:cSld>
@@ -13289,7 +13466,7 @@
           <p:cNvPr id="2" name="Title 1">
             <a:extLst>
               <a:ext uri="{FF2B5EF4-FFF2-40B4-BE49-F238E27FC236}">
-                <a16:creationId xmlns:a16="http://schemas.microsoft.com/office/drawing/2014/main" id="{AE824C0D-BBA7-C64A-9610-0B0118731CD6}"/>
+                <a16:creationId xmlns:a16="http://schemas.microsoft.com/office/drawing/2014/main" xmlns="" id="{F4AA51B8-87BB-4F4F-8025-63DE5AF03D31}"/>
               </a:ext>
             </a:extLst>
           </p:cNvPr>
@@ -13307,7 +13484,7 @@
           <a:p>
             <a:r>
               <a:rPr lang="en-US" dirty="0"/>
-              <a:t>Reconcile names</a:t>
+              <a:t>Select media type</a:t>
             </a:r>
           </a:p>
         </p:txBody>
@@ -13317,7 +13494,7 @@
           <p:cNvPr id="3" name="Content Placeholder 2">
             <a:extLst>
               <a:ext uri="{FF2B5EF4-FFF2-40B4-BE49-F238E27FC236}">
-                <a16:creationId xmlns:a16="http://schemas.microsoft.com/office/drawing/2014/main" id="{9D2CA8E7-BE05-8B41-B7E9-772757CB4636}"/>
+                <a16:creationId xmlns:a16="http://schemas.microsoft.com/office/drawing/2014/main" xmlns="" id="{4E8C874A-AFB7-474C-9D6B-A13FA2BE3DB8}"/>
               </a:ext>
             </a:extLst>
           </p:cNvPr>
@@ -13330,173 +13507,50 @@
         </p:nvSpPr>
         <p:spPr/>
         <p:txBody>
-          <a:bodyPr>
-            <a:normAutofit fontScale="85000" lnSpcReduction="20000"/>
-          </a:bodyPr>
+          <a:bodyPr/>
           <a:lstStyle/>
           <a:p>
             <a:r>
-              <a:rPr lang="en-US" dirty="0"/>
-              <a:t>First Name =&gt; </a:t>
-            </a:r>
-            <a:r>
-              <a:rPr lang="en-US" dirty="0" err="1"/>
-              <a:t>givenName</a:t>
-            </a:r>
-            <a:r>
-              <a:rPr lang="en-US" dirty="0"/>
-              <a:t> (Person – </a:t>
-            </a:r>
-            <a:r>
-              <a:rPr lang="en-US" dirty="0" err="1"/>
-              <a:t>schema.org</a:t>
-            </a:r>
-            <a:r>
-              <a:rPr lang="en-US" dirty="0"/>
-              <a:t>)</a:t>
-            </a:r>
-          </a:p>
-          <a:p>
-            <a:r>
-              <a:rPr lang="en-US" dirty="0"/>
-              <a:t>Last Name =&gt; </a:t>
-            </a:r>
-            <a:r>
-              <a:rPr lang="en-US" dirty="0" err="1"/>
-              <a:t>familyName</a:t>
-            </a:r>
-            <a:r>
-              <a:rPr lang="en-US" dirty="0"/>
-              <a:t> (Person – </a:t>
-            </a:r>
-            <a:r>
-              <a:rPr lang="en-US" dirty="0" err="1"/>
-              <a:t>schema.org</a:t>
-            </a:r>
-            <a:r>
-              <a:rPr lang="en-US" dirty="0"/>
-              <a:t>)</a:t>
-            </a:r>
-          </a:p>
-          <a:p>
-            <a:r>
-              <a:rPr lang="en-US" dirty="0"/>
-              <a:t>Street Address =&gt; </a:t>
-            </a:r>
-            <a:r>
-              <a:rPr lang="en-US" dirty="0" err="1"/>
-              <a:t>streetAddress</a:t>
-            </a:r>
-            <a:r>
-              <a:rPr lang="en-US" dirty="0"/>
-              <a:t> (</a:t>
-            </a:r>
-            <a:r>
-              <a:rPr lang="en-US" dirty="0" err="1"/>
-              <a:t>PostalAddress</a:t>
-            </a:r>
-            <a:r>
-              <a:rPr lang="en-US" dirty="0"/>
-              <a:t> – </a:t>
-            </a:r>
-            <a:r>
-              <a:rPr lang="en-US" dirty="0" err="1"/>
-              <a:t>schema.org</a:t>
-            </a:r>
-            <a:r>
-              <a:rPr lang="en-US" dirty="0"/>
-              <a:t>)</a:t>
-            </a:r>
-          </a:p>
-          <a:p>
-            <a:r>
-              <a:rPr lang="en-US" dirty="0"/>
-              <a:t>City, State, Zip =&gt; </a:t>
-            </a:r>
-            <a:r>
-              <a:rPr lang="en-US" dirty="0" err="1"/>
-              <a:t>streetAddress</a:t>
+              <a:rPr lang="en-US" dirty="0" err="1" smtClean="0"/>
+              <a:t>Collection+JSON</a:t>
+            </a:r>
+            <a:endParaRPr lang="en-US" dirty="0" smtClean="0"/>
+          </a:p>
+          <a:p>
+            <a:pPr lvl="1"/>
+            <a:r>
+              <a:rPr lang="en-US" dirty="0" smtClean="0"/>
+              <a:t>Supports the use of semantic profiles</a:t>
+            </a:r>
+          </a:p>
+          <a:p>
+            <a:pPr lvl="1"/>
+            <a:r>
+              <a:rPr lang="en-US" dirty="0" smtClean="0"/>
+              <a:t>JSON-Based for management and querying of simple collections</a:t>
+            </a:r>
+          </a:p>
+          <a:p>
+            <a:pPr lvl="1"/>
+            <a:r>
+              <a:rPr lang="en-US" dirty="0" smtClean="0"/>
+              <a:t>Supports CRUD – Create, Read, Update and Delete</a:t>
+            </a:r>
+          </a:p>
+          <a:p>
+            <a:pPr lvl="2"/>
+            <a:r>
+              <a:rPr lang="en-US" dirty="0" smtClean="0"/>
+              <a:t>HTTP verbs – GET, POST, PUT and DELETE</a:t>
             </a:r>
             <a:endParaRPr lang="en-US" dirty="0"/>
-          </a:p>
-          <a:p>
-            <a:r>
-              <a:rPr lang="en-US" dirty="0"/>
-              <a:t>Item bought =&gt; item (Property – </a:t>
-            </a:r>
-            <a:r>
-              <a:rPr lang="en-US" dirty="0" err="1"/>
-              <a:t>schema.org</a:t>
-            </a:r>
-            <a:r>
-              <a:rPr lang="en-US" dirty="0"/>
-              <a:t>)</a:t>
-            </a:r>
-          </a:p>
-          <a:p>
-            <a:r>
-              <a:rPr lang="en-US" dirty="0"/>
-              <a:t>Quantity =&gt; </a:t>
-            </a:r>
-            <a:r>
-              <a:rPr lang="en-US" dirty="0" err="1"/>
-              <a:t>orderQuantity</a:t>
-            </a:r>
-            <a:r>
-              <a:rPr lang="en-US" dirty="0"/>
-              <a:t> (Property – </a:t>
-            </a:r>
-            <a:r>
-              <a:rPr lang="en-US" dirty="0" err="1"/>
-              <a:t>schema.org</a:t>
-            </a:r>
-            <a:r>
-              <a:rPr lang="en-US" dirty="0"/>
-              <a:t>)</a:t>
-            </a:r>
-          </a:p>
-          <a:p>
-            <a:r>
-              <a:rPr lang="en-US" dirty="0"/>
-              <a:t>Price =&gt; price (Property – </a:t>
-            </a:r>
-            <a:r>
-              <a:rPr lang="en-US" dirty="0" err="1"/>
-              <a:t>schema.org</a:t>
-            </a:r>
-            <a:r>
-              <a:rPr lang="en-US" dirty="0"/>
-              <a:t>)</a:t>
-            </a:r>
-          </a:p>
-          <a:p>
-            <a:r>
-              <a:rPr lang="en-US" dirty="0"/>
-              <a:t>Total =&gt; </a:t>
-            </a:r>
-            <a:r>
-              <a:rPr lang="en-US" dirty="0" err="1"/>
-              <a:t>totalPrice</a:t>
-            </a:r>
-            <a:r>
-              <a:rPr lang="en-US" dirty="0"/>
-              <a:t> (Property – </a:t>
-            </a:r>
-            <a:r>
-              <a:rPr lang="en-US" dirty="0" err="1"/>
-              <a:t>schema.org</a:t>
-            </a:r>
-            <a:r>
-              <a:rPr lang="en-US" dirty="0"/>
-              <a:t>)</a:t>
-            </a:r>
           </a:p>
         </p:txBody>
       </p:sp>
     </p:spTree>
     <p:extLst>
       <p:ext uri="{BB962C8B-B14F-4D97-AF65-F5344CB8AC3E}">
-        <p14:creationId xmlns:p14="http://schemas.microsoft.com/office/powerpoint/2010/main" val="2687109813"/>
+        <p14:creationId xmlns:p14="http://schemas.microsoft.com/office/powerpoint/2010/main" val="3602234777"/>
       </p:ext>
     </p:extLst>
   </p:cSld>
@@ -13528,7 +13582,7 @@
           <p:cNvPr id="2" name="Title 1">
             <a:extLst>
               <a:ext uri="{FF2B5EF4-FFF2-40B4-BE49-F238E27FC236}">
-                <a16:creationId xmlns:a16="http://schemas.microsoft.com/office/drawing/2014/main" id="{F4AA51B8-87BB-4F4F-8025-63DE5AF03D31}"/>
+                <a16:creationId xmlns:a16="http://schemas.microsoft.com/office/drawing/2014/main" xmlns="" id="{8A91D19E-FE4B-BE41-AC17-F96D01AFD293}"/>
               </a:ext>
             </a:extLst>
           </p:cNvPr>
@@ -13546,7 +13600,7 @@
           <a:p>
             <a:r>
               <a:rPr lang="en-US" dirty="0"/>
-              <a:t>Select media type</a:t>
+              <a:t>Create a profile</a:t>
             </a:r>
           </a:p>
         </p:txBody>
@@ -13556,7 +13610,7 @@
           <p:cNvPr id="3" name="Content Placeholder 2">
             <a:extLst>
               <a:ext uri="{FF2B5EF4-FFF2-40B4-BE49-F238E27FC236}">
-                <a16:creationId xmlns:a16="http://schemas.microsoft.com/office/drawing/2014/main" id="{4E8C874A-AFB7-474C-9D6B-A13FA2BE3DB8}"/>
+                <a16:creationId xmlns:a16="http://schemas.microsoft.com/office/drawing/2014/main" xmlns="" id="{BDF6C152-7F32-3E46-A62D-0DA0C36D059B}"/>
               </a:ext>
             </a:extLst>
           </p:cNvPr>
@@ -13573,9 +13627,114 @@
           <a:lstStyle/>
           <a:p>
             <a:r>
+              <a:rPr lang="en-US" dirty="0"/>
+              <a:t>ALPS Profile</a:t>
+            </a:r>
+          </a:p>
+          <a:p>
+            <a:r>
+              <a:rPr lang="en-US" dirty="0"/>
+              <a:t>&lt;link </a:t>
+            </a:r>
+            <a:r>
               <a:rPr lang="en-US" dirty="0" err="1"/>
-              <a:t>Collection+JSON</a:t>
-            </a:r>
+              <a:t>rel</a:t>
+            </a:r>
+            <a:r>
+              <a:rPr lang="en-US" dirty="0"/>
+              <a:t>=“profile” </a:t>
+            </a:r>
+            <a:r>
+              <a:rPr lang="en-US" dirty="0" err="1"/>
+              <a:t>href</a:t>
+            </a:r>
+            <a:r>
+              <a:rPr lang="en-US" dirty="0"/>
+              <a:t>=</a:t>
+            </a:r>
+            <a:r>
+              <a:rPr lang="en-US" dirty="0">
+                <a:hlinkClick r:id="rId2"/>
+              </a:rPr>
+              <a:t>http://schema.org/Person</a:t>
+            </a:r>
+            <a:r>
+              <a:rPr lang="en-US" dirty="0"/>
+              <a:t>&gt;</a:t>
+            </a:r>
+          </a:p>
+          <a:p>
+            <a:r>
+              <a:rPr lang="en-US" dirty="0"/>
+              <a:t>&lt;link </a:t>
+            </a:r>
+            <a:r>
+              <a:rPr lang="en-US" dirty="0" err="1"/>
+              <a:t>rel</a:t>
+            </a:r>
+            <a:r>
+              <a:rPr lang="en-US" dirty="0"/>
+              <a:t>=“profile” </a:t>
+            </a:r>
+            <a:r>
+              <a:rPr lang="en-US" dirty="0" err="1"/>
+              <a:t>href</a:t>
+            </a:r>
+            <a:r>
+              <a:rPr lang="en-US" dirty="0"/>
+              <a:t>=</a:t>
+            </a:r>
+            <a:r>
+              <a:rPr lang="en-US" dirty="0">
+                <a:hlinkClick r:id="rId3"/>
+              </a:rPr>
+              <a:t>http://schema.org/</a:t>
+            </a:r>
+            <a:r>
+              <a:rPr lang="en-US" dirty="0" err="1"/>
+              <a:t>PostalAddress</a:t>
+            </a:r>
+            <a:r>
+              <a:rPr lang="en-US" dirty="0"/>
+              <a:t>”&gt;</a:t>
+            </a:r>
+          </a:p>
+          <a:p>
+            <a:r>
+              <a:rPr lang="en-US" dirty="0"/>
+              <a:t>&lt;link </a:t>
+            </a:r>
+            <a:r>
+              <a:rPr lang="en-US" dirty="0" err="1"/>
+              <a:t>rel</a:t>
+            </a:r>
+            <a:r>
+              <a:rPr lang="en-US" dirty="0"/>
+              <a:t>=“profile” </a:t>
+            </a:r>
+            <a:r>
+              <a:rPr lang="en-US" dirty="0" err="1"/>
+              <a:t>href</a:t>
+            </a:r>
+            <a:r>
+              <a:rPr lang="en-US" dirty="0"/>
+              <a:t>=</a:t>
+            </a:r>
+            <a:r>
+              <a:rPr lang="en-US" dirty="0">
+                <a:hlinkClick r:id="rId2"/>
+              </a:rPr>
+              <a:t>http://schema.org/P</a:t>
+            </a:r>
+            <a:r>
+              <a:rPr lang="en-US" dirty="0"/>
+              <a:t>roperty”&gt;</a:t>
+            </a:r>
+          </a:p>
+          <a:p>
+            <a:endParaRPr lang="en-US" dirty="0"/>
+          </a:p>
+          <a:p>
             <a:endParaRPr lang="en-US" dirty="0"/>
           </a:p>
         </p:txBody>
@@ -13583,7 +13742,7 @@
     </p:spTree>
     <p:extLst>
       <p:ext uri="{BB962C8B-B14F-4D97-AF65-F5344CB8AC3E}">
-        <p14:creationId xmlns:p14="http://schemas.microsoft.com/office/powerpoint/2010/main" val="3602234777"/>
+        <p14:creationId xmlns:p14="http://schemas.microsoft.com/office/powerpoint/2010/main" val="2748786425"/>
       </p:ext>
     </p:extLst>
   </p:cSld>
@@ -13838,7 +13997,7 @@
   <a:extraClrSchemeLst/>
   <a:extLst>
     <a:ext uri="{05A4C25C-085E-4340-85A3-A5531E510DB2}">
-      <thm15:themeFamily xmlns:thm15="http://schemas.microsoft.com/office/thememl/2012/main" name="Circuit" id="{0AC2F7E7-15F5-431C-B2A2-456FE929F56C}" vid="{0911B802-464C-4241-8DD9-B60FF88E379F}"/>
+      <thm15:themeFamily xmlns:thm15="http://schemas.microsoft.com/office/thememl/2012/main" xmlns="" name="Circuit" id="{0AC2F7E7-15F5-431C-B2A2-456FE929F56C}" vid="{0911B802-464C-4241-8DD9-B60FF88E379F}"/>
     </a:ext>
   </a:extLst>
 </a:theme>

</xml_diff>

<commit_message>
update powerpoint from week 6
</commit_message>
<xml_diff>
--- a/week-6/Hypermedia-design.pptx
+++ b/week-6/Hypermedia-design.pptx
@@ -116,7 +116,7 @@
   </p:defaultTextStyle>
   <p:extLst>
     <p:ext uri="{EFAFB233-063F-42B5-8137-9DF3F51BA10A}">
-      <p15:sldGuideLst xmlns:p15="http://schemas.microsoft.com/office/powerpoint/2012/main" xmlns="">
+      <p15:sldGuideLst xmlns="" xmlns:p15="http://schemas.microsoft.com/office/powerpoint/2012/main">
         <p15:guide id="1" orient="horz" pos="2160" userDrawn="1">
           <p15:clr>
             <a:srgbClr val="A4A3A4"/>
@@ -4409,7 +4409,7 @@
           <a:p>
             <a:fld id="{48A87A34-81AB-432B-8DAE-1953F412C126}" type="datetimeFigureOut">
               <a:rPr lang="en-US" dirty="0"/>
-              <a:t>6/10/2019</a:t>
+              <a:t>6/28/2019</a:t>
             </a:fld>
             <a:endParaRPr lang="en-US" dirty="0"/>
           </a:p>
@@ -4671,7 +4671,7 @@
           <a:p>
             <a:fld id="{48A87A34-81AB-432B-8DAE-1953F412C126}" type="datetimeFigureOut">
               <a:rPr lang="en-US" dirty="0"/>
-              <a:t>6/10/2019</a:t>
+              <a:t>6/28/2019</a:t>
             </a:fld>
             <a:endParaRPr lang="en-US" dirty="0"/>
           </a:p>
@@ -4862,7 +4862,7 @@
           <a:p>
             <a:fld id="{48A87A34-81AB-432B-8DAE-1953F412C126}" type="datetimeFigureOut">
               <a:rPr lang="en-US" dirty="0"/>
-              <a:t>6/10/2019</a:t>
+              <a:t>6/28/2019</a:t>
             </a:fld>
             <a:endParaRPr lang="en-US" dirty="0"/>
           </a:p>
@@ -5120,7 +5120,7 @@
           <a:p>
             <a:fld id="{48A87A34-81AB-432B-8DAE-1953F412C126}" type="datetimeFigureOut">
               <a:rPr lang="en-US" dirty="0"/>
-              <a:t>6/10/2019</a:t>
+              <a:t>6/28/2019</a:t>
             </a:fld>
             <a:endParaRPr lang="en-US" dirty="0"/>
           </a:p>
@@ -5549,7 +5549,7 @@
           <a:p>
             <a:fld id="{48A87A34-81AB-432B-8DAE-1953F412C126}" type="datetimeFigureOut">
               <a:rPr lang="en-US" dirty="0"/>
-              <a:t>6/10/2019</a:t>
+              <a:t>6/28/2019</a:t>
             </a:fld>
             <a:endParaRPr lang="en-US" dirty="0"/>
           </a:p>
@@ -6090,7 +6090,7 @@
           <a:p>
             <a:fld id="{48A87A34-81AB-432B-8DAE-1953F412C126}" type="datetimeFigureOut">
               <a:rPr lang="en-US" dirty="0"/>
-              <a:t>6/10/2019</a:t>
+              <a:t>6/28/2019</a:t>
             </a:fld>
             <a:endParaRPr lang="en-US" dirty="0"/>
           </a:p>
@@ -6805,7 +6805,7 @@
           <a:p>
             <a:fld id="{48A87A34-81AB-432B-8DAE-1953F412C126}" type="datetimeFigureOut">
               <a:rPr lang="en-US" dirty="0"/>
-              <a:t>6/10/2019</a:t>
+              <a:t>6/28/2019</a:t>
             </a:fld>
             <a:endParaRPr lang="en-US" dirty="0"/>
           </a:p>
@@ -6970,7 +6970,7 @@
           <a:p>
             <a:fld id="{48A87A34-81AB-432B-8DAE-1953F412C126}" type="datetimeFigureOut">
               <a:rPr lang="en-US" dirty="0"/>
-              <a:t>6/10/2019</a:t>
+              <a:t>6/28/2019</a:t>
             </a:fld>
             <a:endParaRPr lang="en-US" dirty="0"/>
           </a:p>
@@ -7145,7 +7145,7 @@
           <a:p>
             <a:fld id="{48A87A34-81AB-432B-8DAE-1953F412C126}" type="datetimeFigureOut">
               <a:rPr lang="en-US" dirty="0"/>
-              <a:t>6/10/2019</a:t>
+              <a:t>6/28/2019</a:t>
             </a:fld>
             <a:endParaRPr lang="en-US" dirty="0"/>
           </a:p>
@@ -7310,7 +7310,7 @@
           <a:p>
             <a:fld id="{48A87A34-81AB-432B-8DAE-1953F412C126}" type="datetimeFigureOut">
               <a:rPr lang="en-US" dirty="0"/>
-              <a:t>6/10/2019</a:t>
+              <a:t>6/28/2019</a:t>
             </a:fld>
             <a:endParaRPr lang="en-US" dirty="0"/>
           </a:p>
@@ -7555,7 +7555,7 @@
           <a:p>
             <a:fld id="{48A87A34-81AB-432B-8DAE-1953F412C126}" type="datetimeFigureOut">
               <a:rPr lang="en-US" dirty="0"/>
-              <a:t>6/10/2019</a:t>
+              <a:t>6/28/2019</a:t>
             </a:fld>
             <a:endParaRPr lang="en-US" dirty="0"/>
           </a:p>
@@ -7782,7 +7782,7 @@
           <a:p>
             <a:fld id="{48A87A34-81AB-432B-8DAE-1953F412C126}" type="datetimeFigureOut">
               <a:rPr lang="en-US" dirty="0"/>
-              <a:t>6/10/2019</a:t>
+              <a:t>6/28/2019</a:t>
             </a:fld>
             <a:endParaRPr lang="en-US" dirty="0"/>
           </a:p>
@@ -8158,7 +8158,7 @@
           <a:p>
             <a:fld id="{48A87A34-81AB-432B-8DAE-1953F412C126}" type="datetimeFigureOut">
               <a:rPr lang="en-US" dirty="0"/>
-              <a:t>6/10/2019</a:t>
+              <a:t>6/28/2019</a:t>
             </a:fld>
             <a:endParaRPr lang="en-US" dirty="0"/>
           </a:p>
@@ -8271,7 +8271,7 @@
           <a:p>
             <a:fld id="{48A87A34-81AB-432B-8DAE-1953F412C126}" type="datetimeFigureOut">
               <a:rPr lang="en-US" dirty="0"/>
-              <a:t>6/10/2019</a:t>
+              <a:t>6/28/2019</a:t>
             </a:fld>
             <a:endParaRPr lang="en-US" dirty="0"/>
           </a:p>
@@ -8361,7 +8361,7 @@
           <a:p>
             <a:fld id="{48A87A34-81AB-432B-8DAE-1953F412C126}" type="datetimeFigureOut">
               <a:rPr lang="en-US" dirty="0"/>
-              <a:t>6/10/2019</a:t>
+              <a:t>6/28/2019</a:t>
             </a:fld>
             <a:endParaRPr lang="en-US" dirty="0"/>
           </a:p>
@@ -8605,7 +8605,7 @@
           <a:p>
             <a:fld id="{48A87A34-81AB-432B-8DAE-1953F412C126}" type="datetimeFigureOut">
               <a:rPr lang="en-US" dirty="0"/>
-              <a:t>6/10/2019</a:t>
+              <a:t>6/28/2019</a:t>
             </a:fld>
             <a:endParaRPr lang="en-US" dirty="0"/>
           </a:p>
@@ -8880,7 +8880,7 @@
           <a:p>
             <a:fld id="{48A87A34-81AB-432B-8DAE-1953F412C126}" type="datetimeFigureOut">
               <a:rPr lang="en-US" dirty="0"/>
-              <a:t>6/10/2019</a:t>
+              <a:t>6/28/2019</a:t>
             </a:fld>
             <a:endParaRPr lang="en-US" dirty="0"/>
           </a:p>
@@ -11953,7 +11953,7 @@
             <a:fld id="{48A87A34-81AB-432B-8DAE-1953F412C126}" type="datetimeFigureOut">
               <a:rPr lang="en-US" dirty="0"/>
               <a:pPr/>
-              <a:t>6/10/2019</a:t>
+              <a:t>6/28/2019</a:t>
             </a:fld>
             <a:endParaRPr lang="en-US" dirty="0"/>
           </a:p>
@@ -12374,7 +12374,7 @@
           <p:cNvPr id="2" name="Title 1">
             <a:extLst>
               <a:ext uri="{FF2B5EF4-FFF2-40B4-BE49-F238E27FC236}">
-                <a16:creationId xmlns:a16="http://schemas.microsoft.com/office/drawing/2014/main" xmlns="" id="{C654EB24-065B-8E41-8BE8-62FD5130A339}"/>
+                <a16:creationId xmlns="" xmlns:a16="http://schemas.microsoft.com/office/drawing/2014/main" id="{C654EB24-065B-8E41-8BE8-62FD5130A339}"/>
               </a:ext>
             </a:extLst>
           </p:cNvPr>
@@ -12402,7 +12402,7 @@
           <p:cNvPr id="3" name="Subtitle 2">
             <a:extLst>
               <a:ext uri="{FF2B5EF4-FFF2-40B4-BE49-F238E27FC236}">
-                <a16:creationId xmlns:a16="http://schemas.microsoft.com/office/drawing/2014/main" xmlns="" id="{E3BC71AF-9F8A-8446-A164-40261A52DECA}"/>
+                <a16:creationId xmlns="" xmlns:a16="http://schemas.microsoft.com/office/drawing/2014/main" id="{E3BC71AF-9F8A-8446-A164-40261A52DECA}"/>
               </a:ext>
             </a:extLst>
           </p:cNvPr>
@@ -12420,8 +12420,19 @@
           <a:p>
             <a:r>
               <a:rPr lang="en-US" dirty="0"/>
-              <a:t>David Tarvin, Bellevue university</a:t>
-            </a:r>
+              <a:t>David Tarvin, Bellevue </a:t>
+            </a:r>
+            <a:r>
+              <a:rPr lang="en-US" dirty="0" smtClean="0"/>
+              <a:t>university</a:t>
+            </a:r>
+          </a:p>
+          <a:p>
+            <a:r>
+              <a:rPr lang="en-US" smtClean="0"/>
+              <a:t>WEB 420</a:t>
+            </a:r>
+            <a:endParaRPr lang="en-US" dirty="0"/>
           </a:p>
         </p:txBody>
       </p:sp>
@@ -12460,7 +12471,7 @@
           <p:cNvPr id="2" name="Title 1">
             <a:extLst>
               <a:ext uri="{FF2B5EF4-FFF2-40B4-BE49-F238E27FC236}">
-                <a16:creationId xmlns:a16="http://schemas.microsoft.com/office/drawing/2014/main" xmlns="" id="{BB947B40-8DC6-934D-AFF2-5E10C660E3F1}"/>
+                <a16:creationId xmlns="" xmlns:a16="http://schemas.microsoft.com/office/drawing/2014/main" id="{BB947B40-8DC6-934D-AFF2-5E10C660E3F1}"/>
               </a:ext>
             </a:extLst>
           </p:cNvPr>
@@ -12489,7 +12500,7 @@
           <p:cNvPr id="3" name="Content Placeholder 2">
             <a:extLst>
               <a:ext uri="{FF2B5EF4-FFF2-40B4-BE49-F238E27FC236}">
-                <a16:creationId xmlns:a16="http://schemas.microsoft.com/office/drawing/2014/main" xmlns="" id="{48DD9BC4-13DA-7F43-AA91-4E86914A409C}"/>
+                <a16:creationId xmlns="" xmlns:a16="http://schemas.microsoft.com/office/drawing/2014/main" id="{48DD9BC4-13DA-7F43-AA91-4E86914A409C}"/>
               </a:ext>
             </a:extLst>
           </p:cNvPr>
@@ -12666,7 +12677,7 @@
           <p:cNvPr id="2" name="Title 1">
             <a:extLst>
               <a:ext uri="{FF2B5EF4-FFF2-40B4-BE49-F238E27FC236}">
-                <a16:creationId xmlns:a16="http://schemas.microsoft.com/office/drawing/2014/main" xmlns="" id="{6EA08E2B-A4F8-204A-943A-A865070C112A}"/>
+                <a16:creationId xmlns="" xmlns:a16="http://schemas.microsoft.com/office/drawing/2014/main" id="{6EA08E2B-A4F8-204A-943A-A865070C112A}"/>
               </a:ext>
             </a:extLst>
           </p:cNvPr>
@@ -12699,7 +12710,7 @@
           <p:cNvPr id="3" name="Content Placeholder 2">
             <a:extLst>
               <a:ext uri="{FF2B5EF4-FFF2-40B4-BE49-F238E27FC236}">
-                <a16:creationId xmlns:a16="http://schemas.microsoft.com/office/drawing/2014/main" xmlns="" id="{DDC54293-561A-154A-B979-133348982087}"/>
+                <a16:creationId xmlns="" xmlns:a16="http://schemas.microsoft.com/office/drawing/2014/main" id="{DDC54293-561A-154A-B979-133348982087}"/>
               </a:ext>
             </a:extLst>
           </p:cNvPr>
@@ -12757,7 +12768,7 @@
           <p:cNvPr id="2" name="Title 1">
             <a:extLst>
               <a:ext uri="{FF2B5EF4-FFF2-40B4-BE49-F238E27FC236}">
-                <a16:creationId xmlns:a16="http://schemas.microsoft.com/office/drawing/2014/main" xmlns="" id="{23C392B1-A420-9945-89BF-228AB34BC892}"/>
+                <a16:creationId xmlns="" xmlns:a16="http://schemas.microsoft.com/office/drawing/2014/main" id="{23C392B1-A420-9945-89BF-228AB34BC892}"/>
               </a:ext>
             </a:extLst>
           </p:cNvPr>
@@ -12785,7 +12796,7 @@
           <p:cNvPr id="3" name="Content Placeholder 2">
             <a:extLst>
               <a:ext uri="{FF2B5EF4-FFF2-40B4-BE49-F238E27FC236}">
-                <a16:creationId xmlns:a16="http://schemas.microsoft.com/office/drawing/2014/main" xmlns="" id="{CEA7EE19-F4E3-B742-9E35-5BD54A45E5A2}"/>
+                <a16:creationId xmlns="" xmlns:a16="http://schemas.microsoft.com/office/drawing/2014/main" id="{CEA7EE19-F4E3-B742-9E35-5BD54A45E5A2}"/>
               </a:ext>
             </a:extLst>
           </p:cNvPr>
@@ -12843,7 +12854,7 @@
           <p:cNvPr id="2" name="Title 1">
             <a:extLst>
               <a:ext uri="{FF2B5EF4-FFF2-40B4-BE49-F238E27FC236}">
-                <a16:creationId xmlns:a16="http://schemas.microsoft.com/office/drawing/2014/main" xmlns="" id="{2FE069D7-B970-6046-A379-3EBF50D2EB66}"/>
+                <a16:creationId xmlns="" xmlns:a16="http://schemas.microsoft.com/office/drawing/2014/main" id="{2FE069D7-B970-6046-A379-3EBF50D2EB66}"/>
               </a:ext>
             </a:extLst>
           </p:cNvPr>
@@ -12871,7 +12882,7 @@
           <p:cNvPr id="3" name="Content Placeholder 2">
             <a:extLst>
               <a:ext uri="{FF2B5EF4-FFF2-40B4-BE49-F238E27FC236}">
-                <a16:creationId xmlns:a16="http://schemas.microsoft.com/office/drawing/2014/main" xmlns="" id="{839D76D7-B78F-C24E-915D-42B0B665A500}"/>
+                <a16:creationId xmlns="" xmlns:a16="http://schemas.microsoft.com/office/drawing/2014/main" id="{839D76D7-B78F-C24E-915D-42B0B665A500}"/>
               </a:ext>
             </a:extLst>
           </p:cNvPr>
@@ -12967,7 +12978,7 @@
           <p:cNvPr id="2" name="Title 1">
             <a:extLst>
               <a:ext uri="{FF2B5EF4-FFF2-40B4-BE49-F238E27FC236}">
-                <a16:creationId xmlns:a16="http://schemas.microsoft.com/office/drawing/2014/main" xmlns="" id="{AB074070-97F1-F24E-A446-AB85E307F7A8}"/>
+                <a16:creationId xmlns="" xmlns:a16="http://schemas.microsoft.com/office/drawing/2014/main" id="{AB074070-97F1-F24E-A446-AB85E307F7A8}"/>
               </a:ext>
             </a:extLst>
           </p:cNvPr>
@@ -12995,7 +13006,7 @@
           <p:cNvPr id="3" name="Content Placeholder 2">
             <a:extLst>
               <a:ext uri="{FF2B5EF4-FFF2-40B4-BE49-F238E27FC236}">
-                <a16:creationId xmlns:a16="http://schemas.microsoft.com/office/drawing/2014/main" xmlns="" id="{0E11D1D9-867F-6F4F-AB43-70C1EBDEC330}"/>
+                <a16:creationId xmlns="" xmlns:a16="http://schemas.microsoft.com/office/drawing/2014/main" id="{0E11D1D9-867F-6F4F-AB43-70C1EBDEC330}"/>
               </a:ext>
             </a:extLst>
           </p:cNvPr>
@@ -13136,7 +13147,7 @@
           <p:cNvPr id="2" name="Title 1">
             <a:extLst>
               <a:ext uri="{FF2B5EF4-FFF2-40B4-BE49-F238E27FC236}">
-                <a16:creationId xmlns:a16="http://schemas.microsoft.com/office/drawing/2014/main" xmlns="" id="{AEA92EAC-0490-854E-9C9D-EE340FD869B3}"/>
+                <a16:creationId xmlns="" xmlns:a16="http://schemas.microsoft.com/office/drawing/2014/main" id="{AEA92EAC-0490-854E-9C9D-EE340FD869B3}"/>
               </a:ext>
             </a:extLst>
           </p:cNvPr>
@@ -13223,7 +13234,7 @@
           <p:cNvPr id="2" name="Title 1">
             <a:extLst>
               <a:ext uri="{FF2B5EF4-FFF2-40B4-BE49-F238E27FC236}">
-                <a16:creationId xmlns:a16="http://schemas.microsoft.com/office/drawing/2014/main" xmlns="" id="{AE824C0D-BBA7-C64A-9610-0B0118731CD6}"/>
+                <a16:creationId xmlns="" xmlns:a16="http://schemas.microsoft.com/office/drawing/2014/main" id="{AE824C0D-BBA7-C64A-9610-0B0118731CD6}"/>
               </a:ext>
             </a:extLst>
           </p:cNvPr>
@@ -13251,7 +13262,7 @@
           <p:cNvPr id="3" name="Content Placeholder 2">
             <a:extLst>
               <a:ext uri="{FF2B5EF4-FFF2-40B4-BE49-F238E27FC236}">
-                <a16:creationId xmlns:a16="http://schemas.microsoft.com/office/drawing/2014/main" xmlns="" id="{9D2CA8E7-BE05-8B41-B7E9-772757CB4636}"/>
+                <a16:creationId xmlns="" xmlns:a16="http://schemas.microsoft.com/office/drawing/2014/main" id="{9D2CA8E7-BE05-8B41-B7E9-772757CB4636}"/>
               </a:ext>
             </a:extLst>
           </p:cNvPr>
@@ -13466,7 +13477,7 @@
           <p:cNvPr id="2" name="Title 1">
             <a:extLst>
               <a:ext uri="{FF2B5EF4-FFF2-40B4-BE49-F238E27FC236}">
-                <a16:creationId xmlns:a16="http://schemas.microsoft.com/office/drawing/2014/main" xmlns="" id="{F4AA51B8-87BB-4F4F-8025-63DE5AF03D31}"/>
+                <a16:creationId xmlns="" xmlns:a16="http://schemas.microsoft.com/office/drawing/2014/main" id="{F4AA51B8-87BB-4F4F-8025-63DE5AF03D31}"/>
               </a:ext>
             </a:extLst>
           </p:cNvPr>
@@ -13494,7 +13505,7 @@
           <p:cNvPr id="3" name="Content Placeholder 2">
             <a:extLst>
               <a:ext uri="{FF2B5EF4-FFF2-40B4-BE49-F238E27FC236}">
-                <a16:creationId xmlns:a16="http://schemas.microsoft.com/office/drawing/2014/main" xmlns="" id="{4E8C874A-AFB7-474C-9D6B-A13FA2BE3DB8}"/>
+                <a16:creationId xmlns="" xmlns:a16="http://schemas.microsoft.com/office/drawing/2014/main" id="{4E8C874A-AFB7-474C-9D6B-A13FA2BE3DB8}"/>
               </a:ext>
             </a:extLst>
           </p:cNvPr>
@@ -13582,7 +13593,7 @@
           <p:cNvPr id="2" name="Title 1">
             <a:extLst>
               <a:ext uri="{FF2B5EF4-FFF2-40B4-BE49-F238E27FC236}">
-                <a16:creationId xmlns:a16="http://schemas.microsoft.com/office/drawing/2014/main" xmlns="" id="{8A91D19E-FE4B-BE41-AC17-F96D01AFD293}"/>
+                <a16:creationId xmlns="" xmlns:a16="http://schemas.microsoft.com/office/drawing/2014/main" id="{8A91D19E-FE4B-BE41-AC17-F96D01AFD293}"/>
               </a:ext>
             </a:extLst>
           </p:cNvPr>
@@ -13610,7 +13621,7 @@
           <p:cNvPr id="3" name="Content Placeholder 2">
             <a:extLst>
               <a:ext uri="{FF2B5EF4-FFF2-40B4-BE49-F238E27FC236}">
-                <a16:creationId xmlns:a16="http://schemas.microsoft.com/office/drawing/2014/main" xmlns="" id="{BDF6C152-7F32-3E46-A62D-0DA0C36D059B}"/>
+                <a16:creationId xmlns="" xmlns:a16="http://schemas.microsoft.com/office/drawing/2014/main" id="{BDF6C152-7F32-3E46-A62D-0DA0C36D059B}"/>
               </a:ext>
             </a:extLst>
           </p:cNvPr>
@@ -13997,7 +14008,7 @@
   <a:extraClrSchemeLst/>
   <a:extLst>
     <a:ext uri="{05A4C25C-085E-4340-85A3-A5531E510DB2}">
-      <thm15:themeFamily xmlns:thm15="http://schemas.microsoft.com/office/thememl/2012/main" xmlns="" name="Circuit" id="{0AC2F7E7-15F5-431C-B2A2-456FE929F56C}" vid="{0911B802-464C-4241-8DD9-B60FF88E379F}"/>
+      <thm15:themeFamily xmlns="" xmlns:thm15="http://schemas.microsoft.com/office/thememl/2012/main" name="Circuit" id="{0AC2F7E7-15F5-431C-B2A2-456FE929F56C}" vid="{0911B802-464C-4241-8DD9-B60FF88E379F}"/>
     </a:ext>
   </a:extLst>
 </a:theme>

</xml_diff>